<commit_message>
slides week 1 and readme
</commit_message>
<xml_diff>
--- a/lectures/week-1/slides/week1.pptx
+++ b/lectures/week-1/slides/week1.pptx
@@ -4,24 +4,29 @@
   <p:sldMasterIdLst>
     <p:sldMasterId id="2147483648" r:id="rId1"/>
   </p:sldMasterIdLst>
+  <p:notesMasterIdLst>
+    <p:notesMasterId r:id="rId21"/>
+  </p:notesMasterIdLst>
   <p:sldIdLst>
     <p:sldId id="256" r:id="rId2"/>
     <p:sldId id="257" r:id="rId3"/>
     <p:sldId id="258" r:id="rId4"/>
     <p:sldId id="259" r:id="rId5"/>
-    <p:sldId id="261" r:id="rId6"/>
-    <p:sldId id="260" r:id="rId7"/>
-    <p:sldId id="262" r:id="rId8"/>
-    <p:sldId id="263" r:id="rId9"/>
-    <p:sldId id="264" r:id="rId10"/>
-    <p:sldId id="266" r:id="rId11"/>
-    <p:sldId id="267" r:id="rId12"/>
-    <p:sldId id="268" r:id="rId13"/>
-    <p:sldId id="269" r:id="rId14"/>
-    <p:sldId id="272" r:id="rId15"/>
-    <p:sldId id="273" r:id="rId16"/>
-    <p:sldId id="274" r:id="rId17"/>
-    <p:sldId id="270" r:id="rId18"/>
+    <p:sldId id="275" r:id="rId6"/>
+    <p:sldId id="276" r:id="rId7"/>
+    <p:sldId id="261" r:id="rId8"/>
+    <p:sldId id="260" r:id="rId9"/>
+    <p:sldId id="262" r:id="rId10"/>
+    <p:sldId id="263" r:id="rId11"/>
+    <p:sldId id="264" r:id="rId12"/>
+    <p:sldId id="266" r:id="rId13"/>
+    <p:sldId id="267" r:id="rId14"/>
+    <p:sldId id="268" r:id="rId15"/>
+    <p:sldId id="269" r:id="rId16"/>
+    <p:sldId id="272" r:id="rId17"/>
+    <p:sldId id="273" r:id="rId18"/>
+    <p:sldId id="274" r:id="rId19"/>
+    <p:sldId id="270" r:id="rId20"/>
   </p:sldIdLst>
   <p:sldSz cx="12192000" cy="6858000"/>
   <p:notesSz cx="6858000" cy="9144000"/>
@@ -121,6 +126,443 @@
     </a:lvl9pPr>
   </p:defaultTextStyle>
 </p:presentation>
+</file>
+
+<file path=ppt/notesMasters/notesMaster1.xml><?xml version="1.0" encoding="utf-8"?>
+<p:notesMaster xmlns:a="http://schemas.openxmlformats.org/drawingml/2006/main" xmlns:r="http://schemas.openxmlformats.org/officeDocument/2006/relationships" xmlns:p="http://schemas.openxmlformats.org/presentationml/2006/main">
+  <p:cSld>
+    <p:bg>
+      <p:bgRef idx="1001">
+        <a:schemeClr val="bg1"/>
+      </p:bgRef>
+    </p:bg>
+    <p:spTree>
+      <p:nvGrpSpPr>
+        <p:cNvPr id="1" name=""/>
+        <p:cNvGrpSpPr/>
+        <p:nvPr/>
+      </p:nvGrpSpPr>
+      <p:grpSpPr>
+        <a:xfrm>
+          <a:off x="0" y="0"/>
+          <a:ext cx="0" cy="0"/>
+          <a:chOff x="0" y="0"/>
+          <a:chExt cx="0" cy="0"/>
+        </a:xfrm>
+      </p:grpSpPr>
+      <p:sp>
+        <p:nvSpPr>
+          <p:cNvPr id="2" name="Header Placeholder 1"/>
+          <p:cNvSpPr>
+            <a:spLocks noGrp="1"/>
+          </p:cNvSpPr>
+          <p:nvPr>
+            <p:ph type="hdr" sz="quarter"/>
+          </p:nvPr>
+        </p:nvSpPr>
+        <p:spPr>
+          <a:xfrm>
+            <a:off x="0" y="0"/>
+            <a:ext cx="2971800" cy="458788"/>
+          </a:xfrm>
+          <a:prstGeom prst="rect">
+            <a:avLst/>
+          </a:prstGeom>
+        </p:spPr>
+        <p:txBody>
+          <a:bodyPr vert="horz" lIns="91440" tIns="45720" rIns="91440" bIns="45720" rtlCol="0"/>
+          <a:lstStyle>
+            <a:lvl1pPr algn="l">
+              <a:defRPr sz="1200"/>
+            </a:lvl1pPr>
+          </a:lstStyle>
+          <a:p>
+            <a:endParaRPr lang="en-US"/>
+          </a:p>
+        </p:txBody>
+      </p:sp>
+      <p:sp>
+        <p:nvSpPr>
+          <p:cNvPr id="3" name="Date Placeholder 2"/>
+          <p:cNvSpPr>
+            <a:spLocks noGrp="1"/>
+          </p:cNvSpPr>
+          <p:nvPr>
+            <p:ph type="dt" idx="1"/>
+          </p:nvPr>
+        </p:nvSpPr>
+        <p:spPr>
+          <a:xfrm>
+            <a:off x="3884613" y="0"/>
+            <a:ext cx="2971800" cy="458788"/>
+          </a:xfrm>
+          <a:prstGeom prst="rect">
+            <a:avLst/>
+          </a:prstGeom>
+        </p:spPr>
+        <p:txBody>
+          <a:bodyPr vert="horz" lIns="91440" tIns="45720" rIns="91440" bIns="45720" rtlCol="0"/>
+          <a:lstStyle>
+            <a:lvl1pPr algn="r">
+              <a:defRPr sz="1200"/>
+            </a:lvl1pPr>
+          </a:lstStyle>
+          <a:p>
+            <a:fld id="{0F21D800-7884-EB4E-9ABC-6E25C7B01D14}" type="datetimeFigureOut">
+              <a:rPr lang="en-US" smtClean="0"/>
+              <a:t>1/20/21</a:t>
+            </a:fld>
+            <a:endParaRPr lang="en-US"/>
+          </a:p>
+        </p:txBody>
+      </p:sp>
+      <p:sp>
+        <p:nvSpPr>
+          <p:cNvPr id="4" name="Slide Image Placeholder 3"/>
+          <p:cNvSpPr>
+            <a:spLocks noGrp="1" noRot="1" noChangeAspect="1"/>
+          </p:cNvSpPr>
+          <p:nvPr>
+            <p:ph type="sldImg" idx="2"/>
+          </p:nvPr>
+        </p:nvSpPr>
+        <p:spPr>
+          <a:xfrm>
+            <a:off x="685800" y="1143000"/>
+            <a:ext cx="5486400" cy="3086100"/>
+          </a:xfrm>
+          <a:prstGeom prst="rect">
+            <a:avLst/>
+          </a:prstGeom>
+          <a:noFill/>
+          <a:ln w="12700">
+            <a:solidFill>
+              <a:prstClr val="black"/>
+            </a:solidFill>
+          </a:ln>
+        </p:spPr>
+        <p:txBody>
+          <a:bodyPr vert="horz" lIns="91440" tIns="45720" rIns="91440" bIns="45720" rtlCol="0" anchor="ctr"/>
+          <a:lstStyle/>
+          <a:p>
+            <a:endParaRPr lang="en-US"/>
+          </a:p>
+        </p:txBody>
+      </p:sp>
+      <p:sp>
+        <p:nvSpPr>
+          <p:cNvPr id="5" name="Notes Placeholder 4"/>
+          <p:cNvSpPr>
+            <a:spLocks noGrp="1"/>
+          </p:cNvSpPr>
+          <p:nvPr>
+            <p:ph type="body" sz="quarter" idx="3"/>
+          </p:nvPr>
+        </p:nvSpPr>
+        <p:spPr>
+          <a:xfrm>
+            <a:off x="685800" y="4400550"/>
+            <a:ext cx="5486400" cy="3600450"/>
+          </a:xfrm>
+          <a:prstGeom prst="rect">
+            <a:avLst/>
+          </a:prstGeom>
+        </p:spPr>
+        <p:txBody>
+          <a:bodyPr vert="horz" lIns="91440" tIns="45720" rIns="91440" bIns="45720" rtlCol="0"/>
+          <a:lstStyle/>
+          <a:p>
+            <a:pPr lvl="0"/>
+            <a:r>
+              <a:rPr lang="en-GB"/>
+              <a:t>Click to edit Master text styles</a:t>
+            </a:r>
+          </a:p>
+          <a:p>
+            <a:pPr lvl="1"/>
+            <a:r>
+              <a:rPr lang="en-GB"/>
+              <a:t>Second level</a:t>
+            </a:r>
+          </a:p>
+          <a:p>
+            <a:pPr lvl="2"/>
+            <a:r>
+              <a:rPr lang="en-GB"/>
+              <a:t>Third level</a:t>
+            </a:r>
+          </a:p>
+          <a:p>
+            <a:pPr lvl="3"/>
+            <a:r>
+              <a:rPr lang="en-GB"/>
+              <a:t>Fourth level</a:t>
+            </a:r>
+          </a:p>
+          <a:p>
+            <a:pPr lvl="4"/>
+            <a:r>
+              <a:rPr lang="en-GB"/>
+              <a:t>Fifth level</a:t>
+            </a:r>
+            <a:endParaRPr lang="en-US"/>
+          </a:p>
+        </p:txBody>
+      </p:sp>
+      <p:sp>
+        <p:nvSpPr>
+          <p:cNvPr id="6" name="Footer Placeholder 5"/>
+          <p:cNvSpPr>
+            <a:spLocks noGrp="1"/>
+          </p:cNvSpPr>
+          <p:nvPr>
+            <p:ph type="ftr" sz="quarter" idx="4"/>
+          </p:nvPr>
+        </p:nvSpPr>
+        <p:spPr>
+          <a:xfrm>
+            <a:off x="0" y="8685213"/>
+            <a:ext cx="2971800" cy="458787"/>
+          </a:xfrm>
+          <a:prstGeom prst="rect">
+            <a:avLst/>
+          </a:prstGeom>
+        </p:spPr>
+        <p:txBody>
+          <a:bodyPr vert="horz" lIns="91440" tIns="45720" rIns="91440" bIns="45720" rtlCol="0" anchor="b"/>
+          <a:lstStyle>
+            <a:lvl1pPr algn="l">
+              <a:defRPr sz="1200"/>
+            </a:lvl1pPr>
+          </a:lstStyle>
+          <a:p>
+            <a:endParaRPr lang="en-US"/>
+          </a:p>
+        </p:txBody>
+      </p:sp>
+      <p:sp>
+        <p:nvSpPr>
+          <p:cNvPr id="7" name="Slide Number Placeholder 6"/>
+          <p:cNvSpPr>
+            <a:spLocks noGrp="1"/>
+          </p:cNvSpPr>
+          <p:nvPr>
+            <p:ph type="sldNum" sz="quarter" idx="5"/>
+          </p:nvPr>
+        </p:nvSpPr>
+        <p:spPr>
+          <a:xfrm>
+            <a:off x="3884613" y="8685213"/>
+            <a:ext cx="2971800" cy="458787"/>
+          </a:xfrm>
+          <a:prstGeom prst="rect">
+            <a:avLst/>
+          </a:prstGeom>
+        </p:spPr>
+        <p:txBody>
+          <a:bodyPr vert="horz" lIns="91440" tIns="45720" rIns="91440" bIns="45720" rtlCol="0" anchor="b"/>
+          <a:lstStyle>
+            <a:lvl1pPr algn="r">
+              <a:defRPr sz="1200"/>
+            </a:lvl1pPr>
+          </a:lstStyle>
+          <a:p>
+            <a:fld id="{645D3C45-D0EE-CC4F-AA4B-8EE3F8C09957}" type="slidenum">
+              <a:rPr lang="en-US" smtClean="0"/>
+              <a:t>‹#›</a:t>
+            </a:fld>
+            <a:endParaRPr lang="en-US"/>
+          </a:p>
+        </p:txBody>
+      </p:sp>
+    </p:spTree>
+    <p:extLst>
+      <p:ext uri="{BB962C8B-B14F-4D97-AF65-F5344CB8AC3E}">
+        <p14:creationId xmlns:p14="http://schemas.microsoft.com/office/powerpoint/2010/main" val="319136577"/>
+      </p:ext>
+    </p:extLst>
+  </p:cSld>
+  <p:clrMap bg1="lt1" tx1="dk1" bg2="lt2" tx2="dk2" accent1="accent1" accent2="accent2" accent3="accent3" accent4="accent4" accent5="accent5" accent6="accent6" hlink="hlink" folHlink="folHlink"/>
+  <p:notesStyle>
+    <a:lvl1pPr marL="0" algn="l" defTabSz="914400" rtl="0" eaLnBrk="1" latinLnBrk="0" hangingPunct="1">
+      <a:defRPr sz="1200" kern="1200">
+        <a:solidFill>
+          <a:schemeClr val="tx1"/>
+        </a:solidFill>
+        <a:latin typeface="+mn-lt"/>
+        <a:ea typeface="+mn-ea"/>
+        <a:cs typeface="+mn-cs"/>
+      </a:defRPr>
+    </a:lvl1pPr>
+    <a:lvl2pPr marL="457200" algn="l" defTabSz="914400" rtl="0" eaLnBrk="1" latinLnBrk="0" hangingPunct="1">
+      <a:defRPr sz="1200" kern="1200">
+        <a:solidFill>
+          <a:schemeClr val="tx1"/>
+        </a:solidFill>
+        <a:latin typeface="+mn-lt"/>
+        <a:ea typeface="+mn-ea"/>
+        <a:cs typeface="+mn-cs"/>
+      </a:defRPr>
+    </a:lvl2pPr>
+    <a:lvl3pPr marL="914400" algn="l" defTabSz="914400" rtl="0" eaLnBrk="1" latinLnBrk="0" hangingPunct="1">
+      <a:defRPr sz="1200" kern="1200">
+        <a:solidFill>
+          <a:schemeClr val="tx1"/>
+        </a:solidFill>
+        <a:latin typeface="+mn-lt"/>
+        <a:ea typeface="+mn-ea"/>
+        <a:cs typeface="+mn-cs"/>
+      </a:defRPr>
+    </a:lvl3pPr>
+    <a:lvl4pPr marL="1371600" algn="l" defTabSz="914400" rtl="0" eaLnBrk="1" latinLnBrk="0" hangingPunct="1">
+      <a:defRPr sz="1200" kern="1200">
+        <a:solidFill>
+          <a:schemeClr val="tx1"/>
+        </a:solidFill>
+        <a:latin typeface="+mn-lt"/>
+        <a:ea typeface="+mn-ea"/>
+        <a:cs typeface="+mn-cs"/>
+      </a:defRPr>
+    </a:lvl4pPr>
+    <a:lvl5pPr marL="1828800" algn="l" defTabSz="914400" rtl="0" eaLnBrk="1" latinLnBrk="0" hangingPunct="1">
+      <a:defRPr sz="1200" kern="1200">
+        <a:solidFill>
+          <a:schemeClr val="tx1"/>
+        </a:solidFill>
+        <a:latin typeface="+mn-lt"/>
+        <a:ea typeface="+mn-ea"/>
+        <a:cs typeface="+mn-cs"/>
+      </a:defRPr>
+    </a:lvl5pPr>
+    <a:lvl6pPr marL="2286000" algn="l" defTabSz="914400" rtl="0" eaLnBrk="1" latinLnBrk="0" hangingPunct="1">
+      <a:defRPr sz="1200" kern="1200">
+        <a:solidFill>
+          <a:schemeClr val="tx1"/>
+        </a:solidFill>
+        <a:latin typeface="+mn-lt"/>
+        <a:ea typeface="+mn-ea"/>
+        <a:cs typeface="+mn-cs"/>
+      </a:defRPr>
+    </a:lvl6pPr>
+    <a:lvl7pPr marL="2743200" algn="l" defTabSz="914400" rtl="0" eaLnBrk="1" latinLnBrk="0" hangingPunct="1">
+      <a:defRPr sz="1200" kern="1200">
+        <a:solidFill>
+          <a:schemeClr val="tx1"/>
+        </a:solidFill>
+        <a:latin typeface="+mn-lt"/>
+        <a:ea typeface="+mn-ea"/>
+        <a:cs typeface="+mn-cs"/>
+      </a:defRPr>
+    </a:lvl7pPr>
+    <a:lvl8pPr marL="3200400" algn="l" defTabSz="914400" rtl="0" eaLnBrk="1" latinLnBrk="0" hangingPunct="1">
+      <a:defRPr sz="1200" kern="1200">
+        <a:solidFill>
+          <a:schemeClr val="tx1"/>
+        </a:solidFill>
+        <a:latin typeface="+mn-lt"/>
+        <a:ea typeface="+mn-ea"/>
+        <a:cs typeface="+mn-cs"/>
+      </a:defRPr>
+    </a:lvl8pPr>
+    <a:lvl9pPr marL="3657600" algn="l" defTabSz="914400" rtl="0" eaLnBrk="1" latinLnBrk="0" hangingPunct="1">
+      <a:defRPr sz="1200" kern="1200">
+        <a:solidFill>
+          <a:schemeClr val="tx1"/>
+        </a:solidFill>
+        <a:latin typeface="+mn-lt"/>
+        <a:ea typeface="+mn-ea"/>
+        <a:cs typeface="+mn-cs"/>
+      </a:defRPr>
+    </a:lvl9pPr>
+  </p:notesStyle>
+</p:notesMaster>
+</file>
+
+<file path=ppt/notesSlides/notesSlide1.xml><?xml version="1.0" encoding="utf-8"?>
+<p:notes xmlns:a="http://schemas.openxmlformats.org/drawingml/2006/main" xmlns:r="http://schemas.openxmlformats.org/officeDocument/2006/relationships" xmlns:p="http://schemas.openxmlformats.org/presentationml/2006/main">
+  <p:cSld>
+    <p:spTree>
+      <p:nvGrpSpPr>
+        <p:cNvPr id="1" name=""/>
+        <p:cNvGrpSpPr/>
+        <p:nvPr/>
+      </p:nvGrpSpPr>
+      <p:grpSpPr>
+        <a:xfrm>
+          <a:off x="0" y="0"/>
+          <a:ext cx="0" cy="0"/>
+          <a:chOff x="0" y="0"/>
+          <a:chExt cx="0" cy="0"/>
+        </a:xfrm>
+      </p:grpSpPr>
+      <p:sp>
+        <p:nvSpPr>
+          <p:cNvPr id="2" name="Slide Image Placeholder 1"/>
+          <p:cNvSpPr>
+            <a:spLocks noGrp="1" noRot="1" noChangeAspect="1"/>
+          </p:cNvSpPr>
+          <p:nvPr>
+            <p:ph type="sldImg"/>
+          </p:nvPr>
+        </p:nvSpPr>
+        <p:spPr/>
+      </p:sp>
+      <p:sp>
+        <p:nvSpPr>
+          <p:cNvPr id="3" name="Notes Placeholder 2"/>
+          <p:cNvSpPr>
+            <a:spLocks noGrp="1"/>
+          </p:cNvSpPr>
+          <p:nvPr>
+            <p:ph type="body" idx="1"/>
+          </p:nvPr>
+        </p:nvSpPr>
+        <p:spPr/>
+        <p:txBody>
+          <a:bodyPr/>
+          <a:lstStyle/>
+          <a:p>
+            <a:r>
+              <a:rPr lang="en-US" dirty="0"/>
+              <a:t>Think like a programmer – able to break complex problem intro smaller, solvable units – divide and conquer</a:t>
+            </a:r>
+          </a:p>
+        </p:txBody>
+      </p:sp>
+      <p:sp>
+        <p:nvSpPr>
+          <p:cNvPr id="4" name="Slide Number Placeholder 3"/>
+          <p:cNvSpPr>
+            <a:spLocks noGrp="1"/>
+          </p:cNvSpPr>
+          <p:nvPr>
+            <p:ph type="sldNum" sz="quarter" idx="5"/>
+          </p:nvPr>
+        </p:nvSpPr>
+        <p:spPr/>
+        <p:txBody>
+          <a:bodyPr/>
+          <a:lstStyle/>
+          <a:p>
+            <a:fld id="{645D3C45-D0EE-CC4F-AA4B-8EE3F8C09957}" type="slidenum">
+              <a:rPr lang="en-US" smtClean="0"/>
+              <a:t>5</a:t>
+            </a:fld>
+            <a:endParaRPr lang="en-US"/>
+          </a:p>
+        </p:txBody>
+      </p:sp>
+    </p:spTree>
+    <p:extLst>
+      <p:ext uri="{BB962C8B-B14F-4D97-AF65-F5344CB8AC3E}">
+        <p14:creationId xmlns:p14="http://schemas.microsoft.com/office/powerpoint/2010/main" val="1759741537"/>
+      </p:ext>
+    </p:extLst>
+  </p:cSld>
+  <p:clrMapOvr>
+    <a:masterClrMapping/>
+  </p:clrMapOvr>
+</p:notes>
 </file>
 
 <file path=ppt/slideLayouts/slideLayout1.xml><?xml version="1.0" encoding="utf-8"?>
@@ -3674,6 +4116,840 @@
 <file path=ppt/slides/slide10.xml><?xml version="1.0" encoding="utf-8"?>
 <p:sld xmlns:a="http://schemas.openxmlformats.org/drawingml/2006/main" xmlns:r="http://schemas.openxmlformats.org/officeDocument/2006/relationships" xmlns:p="http://schemas.openxmlformats.org/presentationml/2006/main">
   <p:cSld>
+    <p:bg>
+      <p:bgPr>
+        <a:solidFill>
+          <a:schemeClr val="bg1"/>
+        </a:solidFill>
+        <a:effectLst/>
+      </p:bgPr>
+    </p:bg>
+    <p:spTree>
+      <p:nvGrpSpPr>
+        <p:cNvPr id="1" name=""/>
+        <p:cNvGrpSpPr/>
+        <p:nvPr/>
+      </p:nvGrpSpPr>
+      <p:grpSpPr>
+        <a:xfrm>
+          <a:off x="0" y="0"/>
+          <a:ext cx="0" cy="0"/>
+          <a:chOff x="0" y="0"/>
+          <a:chExt cx="0" cy="0"/>
+        </a:xfrm>
+      </p:grpSpPr>
+      <p:sp useBgFill="1">
+        <p:nvSpPr>
+          <p:cNvPr id="17" name="Rectangle 16">
+            <a:extLst>
+              <a:ext uri="{FF2B5EF4-FFF2-40B4-BE49-F238E27FC236}">
+                <a16:creationId xmlns:a16="http://schemas.microsoft.com/office/drawing/2014/main" id="{9D25F302-27C5-414F-97F8-6EA0A6C028BA}"/>
+              </a:ext>
+              <a:ext uri="{C183D7F6-B498-43B3-948B-1728B52AA6E4}">
+                <adec:decorative xmlns:adec="http://schemas.microsoft.com/office/drawing/2017/decorative" val="1"/>
+              </a:ext>
+            </a:extLst>
+          </p:cNvPr>
+          <p:cNvSpPr>
+            <a:spLocks noGrp="1" noRot="1" noChangeAspect="1" noMove="1" noResize="1" noEditPoints="1" noAdjustHandles="1" noChangeArrowheads="1" noChangeShapeType="1" noTextEdit="1"/>
+          </p:cNvSpPr>
+          <p:nvPr>
+            <p:extLst>
+              <p:ext uri="{386F3935-93C4-4BCD-93E2-E3B085C9AB24}">
+                <p16:designElem xmlns:p16="http://schemas.microsoft.com/office/powerpoint/2015/main" val="1"/>
+              </p:ext>
+            </p:extLst>
+          </p:nvPr>
+        </p:nvSpPr>
+        <p:spPr>
+          <a:xfrm>
+            <a:off x="0" y="0"/>
+            <a:ext cx="12192000" cy="6858000"/>
+          </a:xfrm>
+          <a:prstGeom prst="rect">
+            <a:avLst/>
+          </a:prstGeom>
+          <a:ln>
+            <a:noFill/>
+          </a:ln>
+        </p:spPr>
+        <p:style>
+          <a:lnRef idx="2">
+            <a:schemeClr val="accent1">
+              <a:shade val="50000"/>
+            </a:schemeClr>
+          </a:lnRef>
+          <a:fillRef idx="1">
+            <a:schemeClr val="accent1"/>
+          </a:fillRef>
+          <a:effectRef idx="0">
+            <a:schemeClr val="accent1"/>
+          </a:effectRef>
+          <a:fontRef idx="minor">
+            <a:schemeClr val="lt1"/>
+          </a:fontRef>
+        </p:style>
+        <p:txBody>
+          <a:bodyPr rtlCol="0" anchor="ctr"/>
+          <a:lstStyle/>
+          <a:p>
+            <a:pPr algn="ctr"/>
+            <a:endParaRPr lang="en-US"/>
+          </a:p>
+        </p:txBody>
+      </p:sp>
+      <p:sp>
+        <p:nvSpPr>
+          <p:cNvPr id="19" name="Right Triangle 18">
+            <a:extLst>
+              <a:ext uri="{FF2B5EF4-FFF2-40B4-BE49-F238E27FC236}">
+                <a16:creationId xmlns:a16="http://schemas.microsoft.com/office/drawing/2014/main" id="{830A36F8-48C2-4842-A87B-8CE8DF4E7FD2}"/>
+              </a:ext>
+              <a:ext uri="{C183D7F6-B498-43B3-948B-1728B52AA6E4}">
+                <adec:decorative xmlns:adec="http://schemas.microsoft.com/office/drawing/2017/decorative" val="1"/>
+              </a:ext>
+            </a:extLst>
+          </p:cNvPr>
+          <p:cNvSpPr>
+            <a:spLocks noGrp="1" noRot="1" noChangeAspect="1" noMove="1" noResize="1" noEditPoints="1" noAdjustHandles="1" noChangeArrowheads="1" noChangeShapeType="1" noTextEdit="1"/>
+          </p:cNvSpPr>
+          <p:nvPr>
+            <p:extLst>
+              <p:ext uri="{386F3935-93C4-4BCD-93E2-E3B085C9AB24}">
+                <p16:designElem xmlns:p16="http://schemas.microsoft.com/office/powerpoint/2015/main" val="1"/>
+              </p:ext>
+            </p:extLst>
+          </p:nvPr>
+        </p:nvSpPr>
+        <p:spPr>
+          <a:xfrm flipH="1">
+            <a:off x="8576720" y="3335867"/>
+            <a:ext cx="3291840" cy="3200400"/>
+          </a:xfrm>
+          <a:prstGeom prst="rtTriangle">
+            <a:avLst/>
+          </a:prstGeom>
+          <a:solidFill>
+            <a:schemeClr val="accent4"/>
+          </a:solidFill>
+          <a:ln>
+            <a:noFill/>
+          </a:ln>
+        </p:spPr>
+        <p:style>
+          <a:lnRef idx="2">
+            <a:schemeClr val="accent1">
+              <a:shade val="50000"/>
+            </a:schemeClr>
+          </a:lnRef>
+          <a:fillRef idx="1">
+            <a:schemeClr val="accent1"/>
+          </a:fillRef>
+          <a:effectRef idx="0">
+            <a:schemeClr val="accent1"/>
+          </a:effectRef>
+          <a:fontRef idx="minor">
+            <a:schemeClr val="lt1"/>
+          </a:fontRef>
+        </p:style>
+        <p:txBody>
+          <a:bodyPr rtlCol="0" anchor="ctr"/>
+          <a:lstStyle/>
+          <a:p>
+            <a:pPr algn="ctr"/>
+            <a:endParaRPr lang="en-US" dirty="0"/>
+          </a:p>
+        </p:txBody>
+      </p:sp>
+      <p:sp>
+        <p:nvSpPr>
+          <p:cNvPr id="21" name="Rectangle 20">
+            <a:extLst>
+              <a:ext uri="{FF2B5EF4-FFF2-40B4-BE49-F238E27FC236}">
+                <a16:creationId xmlns:a16="http://schemas.microsoft.com/office/drawing/2014/main" id="{8F451A30-466B-4996-9BA5-CD6ABCC6D558}"/>
+              </a:ext>
+              <a:ext uri="{C183D7F6-B498-43B3-948B-1728B52AA6E4}">
+                <adec:decorative xmlns:adec="http://schemas.microsoft.com/office/drawing/2017/decorative" val="1"/>
+              </a:ext>
+            </a:extLst>
+          </p:cNvPr>
+          <p:cNvSpPr>
+            <a:spLocks noGrp="1" noRot="1" noChangeAspect="1" noMove="1" noResize="1" noEditPoints="1" noAdjustHandles="1" noChangeArrowheads="1" noChangeShapeType="1" noTextEdit="1"/>
+          </p:cNvSpPr>
+          <p:nvPr>
+            <p:extLst>
+              <p:ext uri="{386F3935-93C4-4BCD-93E2-E3B085C9AB24}">
+                <p16:designElem xmlns:p16="http://schemas.microsoft.com/office/powerpoint/2015/main" val="1"/>
+              </p:ext>
+            </p:extLst>
+          </p:nvPr>
+        </p:nvSpPr>
+        <p:spPr>
+          <a:xfrm>
+            <a:off x="641774" y="623275"/>
+            <a:ext cx="10905053" cy="5607882"/>
+          </a:xfrm>
+          <a:prstGeom prst="rect">
+            <a:avLst/>
+          </a:prstGeom>
+          <a:noFill/>
+          <a:ln w="19050">
+            <a:solidFill>
+              <a:schemeClr val="tx1">
+                <a:lumMod val="75000"/>
+                <a:lumOff val="25000"/>
+              </a:schemeClr>
+            </a:solidFill>
+          </a:ln>
+        </p:spPr>
+        <p:style>
+          <a:lnRef idx="2">
+            <a:schemeClr val="accent1">
+              <a:shade val="50000"/>
+            </a:schemeClr>
+          </a:lnRef>
+          <a:fillRef idx="1">
+            <a:schemeClr val="accent1"/>
+          </a:fillRef>
+          <a:effectRef idx="0">
+            <a:schemeClr val="accent1"/>
+          </a:effectRef>
+          <a:fontRef idx="minor">
+            <a:schemeClr val="lt1"/>
+          </a:fontRef>
+        </p:style>
+        <p:txBody>
+          <a:bodyPr rtlCol="0" anchor="ctr"/>
+          <a:lstStyle/>
+          <a:p>
+            <a:pPr algn="ctr"/>
+            <a:endParaRPr lang="en-US"/>
+          </a:p>
+        </p:txBody>
+      </p:sp>
+      <p:sp>
+        <p:nvSpPr>
+          <p:cNvPr id="2" name="Title 1">
+            <a:extLst>
+              <a:ext uri="{FF2B5EF4-FFF2-40B4-BE49-F238E27FC236}">
+                <a16:creationId xmlns:a16="http://schemas.microsoft.com/office/drawing/2014/main" id="{8F890B9C-2519-844B-ACDD-8F281676CAAC}"/>
+              </a:ext>
+            </a:extLst>
+          </p:cNvPr>
+          <p:cNvSpPr>
+            <a:spLocks noGrp="1"/>
+          </p:cNvSpPr>
+          <p:nvPr>
+            <p:ph type="title"/>
+          </p:nvPr>
+        </p:nvSpPr>
+        <p:spPr>
+          <a:xfrm>
+            <a:off x="1123356" y="1188637"/>
+            <a:ext cx="9984615" cy="1597228"/>
+          </a:xfrm>
+        </p:spPr>
+        <p:txBody>
+          <a:bodyPr>
+            <a:normAutofit/>
+          </a:bodyPr>
+          <a:lstStyle/>
+          <a:p>
+            <a:r>
+              <a:rPr lang="en-US" sz="6000"/>
+              <a:t>Binary?</a:t>
+            </a:r>
+          </a:p>
+        </p:txBody>
+      </p:sp>
+      <p:pic>
+        <p:nvPicPr>
+          <p:cNvPr id="11" name="Picture 10" descr="A close - up of a building&#10;&#10;Description automatically generated with low confidence">
+            <a:extLst>
+              <a:ext uri="{FF2B5EF4-FFF2-40B4-BE49-F238E27FC236}">
+                <a16:creationId xmlns:a16="http://schemas.microsoft.com/office/drawing/2014/main" id="{B0AAD221-BAA4-2F40-AA8E-E4A9606948DD}"/>
+              </a:ext>
+            </a:extLst>
+          </p:cNvPr>
+          <p:cNvPicPr>
+            <a:picLocks noChangeAspect="1"/>
+          </p:cNvPicPr>
+          <p:nvPr/>
+        </p:nvPicPr>
+        <p:blipFill rotWithShape="1">
+          <a:blip r:embed="rId2">
+            <a:extLst>
+              <a:ext uri="{837473B0-CC2E-450A-ABE3-18F120FF3D39}">
+                <a1611:picAttrSrcUrl xmlns:a1611="http://schemas.microsoft.com/office/drawing/2016/11/main" r:id="rId3"/>
+              </a:ext>
+            </a:extLst>
+          </a:blip>
+          <a:srcRect t="3501"/>
+          <a:stretch/>
+        </p:blipFill>
+        <p:spPr>
+          <a:xfrm>
+            <a:off x="1123356" y="2785865"/>
+            <a:ext cx="3533985" cy="2728198"/>
+          </a:xfrm>
+          <a:prstGeom prst="rect">
+            <a:avLst/>
+          </a:prstGeom>
+        </p:spPr>
+      </p:pic>
+      <p:sp>
+        <p:nvSpPr>
+          <p:cNvPr id="3" name="Content Placeholder 2">
+            <a:extLst>
+              <a:ext uri="{FF2B5EF4-FFF2-40B4-BE49-F238E27FC236}">
+                <a16:creationId xmlns:a16="http://schemas.microsoft.com/office/drawing/2014/main" id="{4B4B7A7F-474A-8242-AABD-EC4754E72A60}"/>
+              </a:ext>
+            </a:extLst>
+          </p:cNvPr>
+          <p:cNvSpPr>
+            <a:spLocks noGrp="1"/>
+          </p:cNvSpPr>
+          <p:nvPr>
+            <p:ph idx="1"/>
+          </p:nvPr>
+        </p:nvSpPr>
+        <p:spPr>
+          <a:xfrm>
+            <a:off x="5387926" y="2785865"/>
+            <a:ext cx="4428236" cy="1073858"/>
+          </a:xfrm>
+        </p:spPr>
+        <p:txBody>
+          <a:bodyPr anchor="ctr">
+            <a:normAutofit/>
+          </a:bodyPr>
+          <a:lstStyle/>
+          <a:p>
+            <a:pPr marL="0" indent="0">
+              <a:buNone/>
+            </a:pPr>
+            <a:r>
+              <a:rPr lang="en-US" sz="2000" dirty="0"/>
+              <a:t>Binary is simply a series of 0’s and 1’s</a:t>
+            </a:r>
+          </a:p>
+        </p:txBody>
+      </p:sp>
+      <p:sp>
+        <p:nvSpPr>
+          <p:cNvPr id="13" name="TextBox 12">
+            <a:extLst>
+              <a:ext uri="{FF2B5EF4-FFF2-40B4-BE49-F238E27FC236}">
+                <a16:creationId xmlns:a16="http://schemas.microsoft.com/office/drawing/2014/main" id="{EED1D7AE-8FD3-A540-80A1-FD193378933E}"/>
+              </a:ext>
+            </a:extLst>
+          </p:cNvPr>
+          <p:cNvSpPr txBox="1"/>
+          <p:nvPr/>
+        </p:nvSpPr>
+        <p:spPr>
+          <a:xfrm>
+            <a:off x="5387926" y="4149964"/>
+            <a:ext cx="3735318" cy="369332"/>
+          </a:xfrm>
+          <a:prstGeom prst="rect">
+            <a:avLst/>
+          </a:prstGeom>
+          <a:noFill/>
+        </p:spPr>
+        <p:txBody>
+          <a:bodyPr wrap="none" rtlCol="0">
+            <a:spAutoFit/>
+          </a:bodyPr>
+          <a:lstStyle/>
+          <a:p>
+            <a:r>
+              <a:rPr lang="en-US" dirty="0"/>
+              <a:t>0010010101000101010100101010…..</a:t>
+            </a:r>
+          </a:p>
+        </p:txBody>
+      </p:sp>
+    </p:spTree>
+    <p:extLst>
+      <p:ext uri="{BB962C8B-B14F-4D97-AF65-F5344CB8AC3E}">
+        <p14:creationId xmlns:p14="http://schemas.microsoft.com/office/powerpoint/2010/main" val="3352144595"/>
+      </p:ext>
+    </p:extLst>
+  </p:cSld>
+  <p:clrMapOvr>
+    <a:masterClrMapping/>
+  </p:clrMapOvr>
+</p:sld>
+</file>
+
+<file path=ppt/slides/slide11.xml><?xml version="1.0" encoding="utf-8"?>
+<p:sld xmlns:a="http://schemas.openxmlformats.org/drawingml/2006/main" xmlns:r="http://schemas.openxmlformats.org/officeDocument/2006/relationships" xmlns:p="http://schemas.openxmlformats.org/presentationml/2006/main">
+  <p:cSld>
+    <p:spTree>
+      <p:nvGrpSpPr>
+        <p:cNvPr id="1" name=""/>
+        <p:cNvGrpSpPr/>
+        <p:nvPr/>
+      </p:nvGrpSpPr>
+      <p:grpSpPr>
+        <a:xfrm>
+          <a:off x="0" y="0"/>
+          <a:ext cx="0" cy="0"/>
+          <a:chOff x="0" y="0"/>
+          <a:chExt cx="0" cy="0"/>
+        </a:xfrm>
+      </p:grpSpPr>
+      <p:pic>
+        <p:nvPicPr>
+          <p:cNvPr id="5" name="Graphic 4" descr="Man with solid fill">
+            <a:extLst>
+              <a:ext uri="{FF2B5EF4-FFF2-40B4-BE49-F238E27FC236}">
+                <a16:creationId xmlns:a16="http://schemas.microsoft.com/office/drawing/2014/main" id="{271B71DD-EC5F-2549-8B02-07B7C26AE8C7}"/>
+              </a:ext>
+            </a:extLst>
+          </p:cNvPr>
+          <p:cNvPicPr>
+            <a:picLocks noChangeAspect="1"/>
+          </p:cNvPicPr>
+          <p:nvPr/>
+        </p:nvPicPr>
+        <p:blipFill>
+          <a:blip r:embed="rId2">
+            <a:extLst>
+              <a:ext uri="{96DAC541-7B7A-43D3-8B79-37D633B846F1}">
+                <asvg:svgBlip xmlns:asvg="http://schemas.microsoft.com/office/drawing/2016/SVG/main" r:embed="rId3"/>
+              </a:ext>
+            </a:extLst>
+          </a:blip>
+          <a:stretch>
+            <a:fillRect/>
+          </a:stretch>
+        </p:blipFill>
+        <p:spPr>
+          <a:xfrm>
+            <a:off x="1289221" y="2454124"/>
+            <a:ext cx="2620620" cy="2620620"/>
+          </a:xfrm>
+          <a:prstGeom prst="rect">
+            <a:avLst/>
+          </a:prstGeom>
+        </p:spPr>
+      </p:pic>
+      <p:pic>
+        <p:nvPicPr>
+          <p:cNvPr id="7" name="Graphic 6" descr="Monitor outline">
+            <a:extLst>
+              <a:ext uri="{FF2B5EF4-FFF2-40B4-BE49-F238E27FC236}">
+                <a16:creationId xmlns:a16="http://schemas.microsoft.com/office/drawing/2014/main" id="{CA5D6A5D-9C15-0A41-91B4-756AE1AFDE99}"/>
+              </a:ext>
+            </a:extLst>
+          </p:cNvPr>
+          <p:cNvPicPr>
+            <a:picLocks noChangeAspect="1"/>
+          </p:cNvPicPr>
+          <p:nvPr/>
+        </p:nvPicPr>
+        <p:blipFill>
+          <a:blip r:embed="rId4">
+            <a:extLst>
+              <a:ext uri="{96DAC541-7B7A-43D3-8B79-37D633B846F1}">
+                <asvg:svgBlip xmlns:asvg="http://schemas.microsoft.com/office/drawing/2016/SVG/main" r:embed="rId5"/>
+              </a:ext>
+            </a:extLst>
+          </a:blip>
+          <a:stretch>
+            <a:fillRect/>
+          </a:stretch>
+        </p:blipFill>
+        <p:spPr>
+          <a:xfrm>
+            <a:off x="8282161" y="2454124"/>
+            <a:ext cx="2789493" cy="2789493"/>
+          </a:xfrm>
+          <a:prstGeom prst="rect">
+            <a:avLst/>
+          </a:prstGeom>
+        </p:spPr>
+      </p:pic>
+      <p:sp>
+        <p:nvSpPr>
+          <p:cNvPr id="10" name="Rectangular Callout 9">
+            <a:extLst>
+              <a:ext uri="{FF2B5EF4-FFF2-40B4-BE49-F238E27FC236}">
+                <a16:creationId xmlns:a16="http://schemas.microsoft.com/office/drawing/2014/main" id="{E9C0D844-6190-7B4B-AD13-CACA13F25103}"/>
+              </a:ext>
+            </a:extLst>
+          </p:cNvPr>
+          <p:cNvSpPr/>
+          <p:nvPr/>
+        </p:nvSpPr>
+        <p:spPr>
+          <a:xfrm>
+            <a:off x="2916195" y="2250237"/>
+            <a:ext cx="4102442" cy="407774"/>
+          </a:xfrm>
+          <a:prstGeom prst="wedgeRectCallout">
+            <a:avLst>
+              <a:gd name="adj1" fmla="val -37364"/>
+              <a:gd name="adj2" fmla="val 102822"/>
+            </a:avLst>
+          </a:prstGeom>
+        </p:spPr>
+        <p:style>
+          <a:lnRef idx="2">
+            <a:schemeClr val="accent1">
+              <a:shade val="50000"/>
+            </a:schemeClr>
+          </a:lnRef>
+          <a:fillRef idx="1">
+            <a:schemeClr val="accent1"/>
+          </a:fillRef>
+          <a:effectRef idx="0">
+            <a:schemeClr val="accent1"/>
+          </a:effectRef>
+          <a:fontRef idx="minor">
+            <a:schemeClr val="lt1"/>
+          </a:fontRef>
+        </p:style>
+        <p:txBody>
+          <a:bodyPr rtlCol="0" anchor="ctr"/>
+          <a:lstStyle/>
+          <a:p>
+            <a:pPr algn="ctr"/>
+            <a:r>
+              <a:rPr lang="en-US" dirty="0"/>
+              <a:t>Hey, calculate for me the square root of 9</a:t>
+            </a:r>
+          </a:p>
+        </p:txBody>
+      </p:sp>
+      <p:cxnSp>
+        <p:nvCxnSpPr>
+          <p:cNvPr id="12" name="Straight Arrow Connector 11">
+            <a:extLst>
+              <a:ext uri="{FF2B5EF4-FFF2-40B4-BE49-F238E27FC236}">
+                <a16:creationId xmlns:a16="http://schemas.microsoft.com/office/drawing/2014/main" id="{EECAF30F-17B6-E64C-8F31-9E72B193E3F1}"/>
+              </a:ext>
+            </a:extLst>
+          </p:cNvPr>
+          <p:cNvCxnSpPr/>
+          <p:nvPr/>
+        </p:nvCxnSpPr>
+        <p:spPr>
+          <a:xfrm>
+            <a:off x="4034974" y="3910161"/>
+            <a:ext cx="4122051" cy="0"/>
+          </a:xfrm>
+          <a:prstGeom prst="straightConnector1">
+            <a:avLst/>
+          </a:prstGeom>
+          <a:ln w="57150">
+            <a:tailEnd type="triangle"/>
+          </a:ln>
+        </p:spPr>
+        <p:style>
+          <a:lnRef idx="1">
+            <a:schemeClr val="accent1"/>
+          </a:lnRef>
+          <a:fillRef idx="0">
+            <a:schemeClr val="accent1"/>
+          </a:fillRef>
+          <a:effectRef idx="0">
+            <a:schemeClr val="accent1"/>
+          </a:effectRef>
+          <a:fontRef idx="minor">
+            <a:schemeClr val="tx1"/>
+          </a:fontRef>
+        </p:style>
+      </p:cxnSp>
+      <p:sp>
+        <p:nvSpPr>
+          <p:cNvPr id="11" name="TextBox 10">
+            <a:extLst>
+              <a:ext uri="{FF2B5EF4-FFF2-40B4-BE49-F238E27FC236}">
+                <a16:creationId xmlns:a16="http://schemas.microsoft.com/office/drawing/2014/main" id="{DFBF4528-72F6-B144-826F-238B51B522F5}"/>
+              </a:ext>
+            </a:extLst>
+          </p:cNvPr>
+          <p:cNvSpPr txBox="1"/>
+          <p:nvPr/>
+        </p:nvSpPr>
+        <p:spPr>
+          <a:xfrm>
+            <a:off x="4379183" y="3516609"/>
+            <a:ext cx="3735318" cy="369332"/>
+          </a:xfrm>
+          <a:prstGeom prst="rect">
+            <a:avLst/>
+          </a:prstGeom>
+          <a:noFill/>
+        </p:spPr>
+        <p:txBody>
+          <a:bodyPr wrap="none" rtlCol="0">
+            <a:spAutoFit/>
+          </a:bodyPr>
+          <a:lstStyle/>
+          <a:p>
+            <a:r>
+              <a:rPr lang="en-US" dirty="0"/>
+              <a:t>0010010101000101010100101010…..</a:t>
+            </a:r>
+          </a:p>
+        </p:txBody>
+      </p:sp>
+      <p:sp>
+        <p:nvSpPr>
+          <p:cNvPr id="6" name="Content Placeholder 5">
+            <a:extLst>
+              <a:ext uri="{FF2B5EF4-FFF2-40B4-BE49-F238E27FC236}">
+                <a16:creationId xmlns:a16="http://schemas.microsoft.com/office/drawing/2014/main" id="{0BF0383F-3512-4648-AB95-336EC2FE335D}"/>
+              </a:ext>
+            </a:extLst>
+          </p:cNvPr>
+          <p:cNvSpPr>
+            <a:spLocks noGrp="1"/>
+          </p:cNvSpPr>
+          <p:nvPr>
+            <p:ph idx="1"/>
+          </p:nvPr>
+        </p:nvSpPr>
+        <p:spPr>
+          <a:xfrm>
+            <a:off x="838200" y="1253331"/>
+            <a:ext cx="10515600" cy="4351338"/>
+          </a:xfrm>
+        </p:spPr>
+        <p:txBody>
+          <a:bodyPr/>
+          <a:lstStyle/>
+          <a:p>
+            <a:r>
+              <a:rPr lang="en-US" dirty="0"/>
+              <a:t>Back in the day…</a:t>
+            </a:r>
+          </a:p>
+        </p:txBody>
+      </p:sp>
+      <p:sp>
+        <p:nvSpPr>
+          <p:cNvPr id="15" name="TextBox 14">
+            <a:extLst>
+              <a:ext uri="{FF2B5EF4-FFF2-40B4-BE49-F238E27FC236}">
+                <a16:creationId xmlns:a16="http://schemas.microsoft.com/office/drawing/2014/main" id="{685C49FA-6679-0A4C-8453-E8AAE94F08A9}"/>
+              </a:ext>
+            </a:extLst>
+          </p:cNvPr>
+          <p:cNvSpPr txBox="1"/>
+          <p:nvPr/>
+        </p:nvSpPr>
+        <p:spPr>
+          <a:xfrm>
+            <a:off x="9526064" y="3479538"/>
+            <a:ext cx="301686" cy="369332"/>
+          </a:xfrm>
+          <a:prstGeom prst="rect">
+            <a:avLst/>
+          </a:prstGeom>
+          <a:noFill/>
+        </p:spPr>
+        <p:txBody>
+          <a:bodyPr wrap="none" rtlCol="0">
+            <a:spAutoFit/>
+          </a:bodyPr>
+          <a:lstStyle/>
+          <a:p>
+            <a:r>
+              <a:rPr lang="en-US" dirty="0"/>
+              <a:t>3</a:t>
+            </a:r>
+          </a:p>
+        </p:txBody>
+      </p:sp>
+      <p:pic>
+        <p:nvPicPr>
+          <p:cNvPr id="18" name="Picture 17" descr="An aerial view of a city&#10;&#10;Description automatically generated with medium confidence">
+            <a:extLst>
+              <a:ext uri="{FF2B5EF4-FFF2-40B4-BE49-F238E27FC236}">
+                <a16:creationId xmlns:a16="http://schemas.microsoft.com/office/drawing/2014/main" id="{6E0A01E5-AA37-334E-9A52-B4D7DBD88E9A}"/>
+              </a:ext>
+            </a:extLst>
+          </p:cNvPr>
+          <p:cNvPicPr>
+            <a:picLocks noChangeAspect="1"/>
+          </p:cNvPicPr>
+          <p:nvPr/>
+        </p:nvPicPr>
+        <p:blipFill>
+          <a:blip r:embed="rId6">
+            <a:extLst>
+              <a:ext uri="{837473B0-CC2E-450A-ABE3-18F120FF3D39}">
+                <a1611:picAttrSrcUrl xmlns:a1611="http://schemas.microsoft.com/office/drawing/2016/11/main" r:id="rId7"/>
+              </a:ext>
+            </a:extLst>
+          </a:blip>
+          <a:stretch>
+            <a:fillRect/>
+          </a:stretch>
+        </p:blipFill>
+        <p:spPr>
+          <a:xfrm flipV="1">
+            <a:off x="4035354" y="4197922"/>
+            <a:ext cx="2789493" cy="1704442"/>
+          </a:xfrm>
+          <a:prstGeom prst="rect">
+            <a:avLst/>
+          </a:prstGeom>
+        </p:spPr>
+      </p:pic>
+      <p:sp>
+        <p:nvSpPr>
+          <p:cNvPr id="19" name="TextBox 18">
+            <a:extLst>
+              <a:ext uri="{FF2B5EF4-FFF2-40B4-BE49-F238E27FC236}">
+                <a16:creationId xmlns:a16="http://schemas.microsoft.com/office/drawing/2014/main" id="{8ED7DD57-D684-2E4F-B562-4FEDD8ADD330}"/>
+              </a:ext>
+            </a:extLst>
+          </p:cNvPr>
+          <p:cNvSpPr txBox="1"/>
+          <p:nvPr/>
+        </p:nvSpPr>
+        <p:spPr>
+          <a:xfrm rot="10800000" flipV="1">
+            <a:off x="0" y="6574630"/>
+            <a:ext cx="3637704" cy="230832"/>
+          </a:xfrm>
+          <a:prstGeom prst="rect">
+            <a:avLst/>
+          </a:prstGeom>
+          <a:noFill/>
+        </p:spPr>
+        <p:txBody>
+          <a:bodyPr wrap="square" rtlCol="0">
+            <a:spAutoFit/>
+          </a:bodyPr>
+          <a:lstStyle/>
+          <a:p>
+            <a:r>
+              <a:rPr lang="en-US" sz="900" dirty="0">
+                <a:hlinkClick r:id="rId7" tooltip="https://en.wikipedia.org/wiki/Computer_program"/>
+              </a:rPr>
+              <a:t>This Photo</a:t>
+            </a:r>
+            <a:r>
+              <a:rPr lang="en-US" sz="900" dirty="0"/>
+              <a:t> by Unknown Author is licensed under </a:t>
+            </a:r>
+            <a:r>
+              <a:rPr lang="en-US" sz="900" dirty="0">
+                <a:hlinkClick r:id="rId8" tooltip="https://creativecommons.org/licenses/by-sa/3.0/"/>
+              </a:rPr>
+              <a:t>CC BY-SA</a:t>
+            </a:r>
+            <a:endParaRPr lang="en-US" sz="900" dirty="0"/>
+          </a:p>
+        </p:txBody>
+      </p:sp>
+      <p:pic>
+        <p:nvPicPr>
+          <p:cNvPr id="21" name="Picture 20" descr="Text, letter&#10;&#10;Description automatically generated">
+            <a:extLst>
+              <a:ext uri="{FF2B5EF4-FFF2-40B4-BE49-F238E27FC236}">
+                <a16:creationId xmlns:a16="http://schemas.microsoft.com/office/drawing/2014/main" id="{A126C503-410D-BC4D-AE7F-4CEFE2CC5EF6}"/>
+              </a:ext>
+            </a:extLst>
+          </p:cNvPr>
+          <p:cNvPicPr>
+            <a:picLocks noChangeAspect="1"/>
+          </p:cNvPicPr>
+          <p:nvPr/>
+        </p:nvPicPr>
+        <p:blipFill>
+          <a:blip r:embed="rId9">
+            <a:extLst>
+              <a:ext uri="{837473B0-CC2E-450A-ABE3-18F120FF3D39}">
+                <a1611:picAttrSrcUrl xmlns:a1611="http://schemas.microsoft.com/office/drawing/2016/11/main" r:id="rId10"/>
+              </a:ext>
+            </a:extLst>
+          </a:blip>
+          <a:stretch>
+            <a:fillRect/>
+          </a:stretch>
+        </p:blipFill>
+        <p:spPr>
+          <a:xfrm>
+            <a:off x="5511805" y="4440155"/>
+            <a:ext cx="2876356" cy="1839669"/>
+          </a:xfrm>
+          <a:prstGeom prst="rect">
+            <a:avLst/>
+          </a:prstGeom>
+        </p:spPr>
+      </p:pic>
+      <p:sp>
+        <p:nvSpPr>
+          <p:cNvPr id="22" name="TextBox 21">
+            <a:extLst>
+              <a:ext uri="{FF2B5EF4-FFF2-40B4-BE49-F238E27FC236}">
+                <a16:creationId xmlns:a16="http://schemas.microsoft.com/office/drawing/2014/main" id="{22042F0D-CCD3-5B42-A84A-1C48AECEA8B7}"/>
+              </a:ext>
+            </a:extLst>
+          </p:cNvPr>
+          <p:cNvSpPr txBox="1"/>
+          <p:nvPr/>
+        </p:nvSpPr>
+        <p:spPr>
+          <a:xfrm>
+            <a:off x="0" y="6344333"/>
+            <a:ext cx="3111134" cy="230833"/>
+          </a:xfrm>
+          <a:prstGeom prst="rect">
+            <a:avLst/>
+          </a:prstGeom>
+          <a:noFill/>
+        </p:spPr>
+        <p:txBody>
+          <a:bodyPr wrap="square" rtlCol="0">
+            <a:spAutoFit/>
+          </a:bodyPr>
+          <a:lstStyle/>
+          <a:p>
+            <a:r>
+              <a:rPr lang="en-US" sz="900" dirty="0">
+                <a:hlinkClick r:id="rId10" tooltip="https://commons.wikimedia.org/wiki/File:Cromemco_Dazzlemation_Program_on_Punched_Paper_Tape.jpg"/>
+              </a:rPr>
+              <a:t>This Photo</a:t>
+            </a:r>
+            <a:r>
+              <a:rPr lang="en-US" sz="900" dirty="0"/>
+              <a:t> by Unknown Author is licensed under </a:t>
+            </a:r>
+            <a:r>
+              <a:rPr lang="en-US" sz="900" dirty="0">
+                <a:hlinkClick r:id="rId8" tooltip="https://creativecommons.org/licenses/by-sa/3.0/"/>
+              </a:rPr>
+              <a:t>CC BY-SA</a:t>
+            </a:r>
+            <a:endParaRPr lang="en-US" sz="900" dirty="0"/>
+          </a:p>
+        </p:txBody>
+      </p:sp>
+    </p:spTree>
+    <p:extLst>
+      <p:ext uri="{BB962C8B-B14F-4D97-AF65-F5344CB8AC3E}">
+        <p14:creationId xmlns:p14="http://schemas.microsoft.com/office/powerpoint/2010/main" val="2603015285"/>
+      </p:ext>
+    </p:extLst>
+  </p:cSld>
+  <p:clrMapOvr>
+    <a:masterClrMapping/>
+  </p:clrMapOvr>
+</p:sld>
+</file>
+
+<file path=ppt/slides/slide12.xml><?xml version="1.0" encoding="utf-8"?>
+<p:sld xmlns:a="http://schemas.openxmlformats.org/drawingml/2006/main" xmlns:r="http://schemas.openxmlformats.org/officeDocument/2006/relationships" xmlns:p="http://schemas.openxmlformats.org/presentationml/2006/main">
+  <p:cSld>
     <p:spTree>
       <p:nvGrpSpPr>
         <p:cNvPr id="1" name=""/>
@@ -4453,7 +5729,7 @@
 </p:sld>
 </file>
 
-<file path=ppt/slides/slide11.xml><?xml version="1.0" encoding="utf-8"?>
+<file path=ppt/slides/slide13.xml><?xml version="1.0" encoding="utf-8"?>
 <p:sld xmlns:a="http://schemas.openxmlformats.org/drawingml/2006/main" xmlns:r="http://schemas.openxmlformats.org/officeDocument/2006/relationships" xmlns:p="http://schemas.openxmlformats.org/presentationml/2006/main">
   <p:cSld>
     <p:spTree>
@@ -5151,7 +6427,7 @@
 </p:sld>
 </file>
 
-<file path=ppt/slides/slide12.xml><?xml version="1.0" encoding="utf-8"?>
+<file path=ppt/slides/slide14.xml><?xml version="1.0" encoding="utf-8"?>
 <p:sld xmlns:a="http://schemas.openxmlformats.org/drawingml/2006/main" xmlns:r="http://schemas.openxmlformats.org/officeDocument/2006/relationships" xmlns:p="http://schemas.openxmlformats.org/presentationml/2006/main">
   <p:cSld>
     <p:spTree>
@@ -5597,498 +6873,6 @@
     <p:extLst>
       <p:ext uri="{BB962C8B-B14F-4D97-AF65-F5344CB8AC3E}">
         <p14:creationId xmlns:p14="http://schemas.microsoft.com/office/powerpoint/2010/main" val="4258149466"/>
-      </p:ext>
-    </p:extLst>
-  </p:cSld>
-  <p:clrMapOvr>
-    <a:masterClrMapping/>
-  </p:clrMapOvr>
-</p:sld>
-</file>
-
-<file path=ppt/slides/slide13.xml><?xml version="1.0" encoding="utf-8"?>
-<p:sld xmlns:a="http://schemas.openxmlformats.org/drawingml/2006/main" xmlns:r="http://schemas.openxmlformats.org/officeDocument/2006/relationships" xmlns:p="http://schemas.openxmlformats.org/presentationml/2006/main">
-  <p:cSld>
-    <p:spTree>
-      <p:nvGrpSpPr>
-        <p:cNvPr id="1" name=""/>
-        <p:cNvGrpSpPr/>
-        <p:nvPr/>
-      </p:nvGrpSpPr>
-      <p:grpSpPr>
-        <a:xfrm>
-          <a:off x="0" y="0"/>
-          <a:ext cx="0" cy="0"/>
-          <a:chOff x="0" y="0"/>
-          <a:chExt cx="0" cy="0"/>
-        </a:xfrm>
-      </p:grpSpPr>
-      <p:sp>
-        <p:nvSpPr>
-          <p:cNvPr id="2" name="Title 1">
-            <a:extLst>
-              <a:ext uri="{FF2B5EF4-FFF2-40B4-BE49-F238E27FC236}">
-                <a16:creationId xmlns:a16="http://schemas.microsoft.com/office/drawing/2014/main" id="{5AB5C9B5-2896-5E4C-BE84-70167FA0DB32}"/>
-              </a:ext>
-            </a:extLst>
-          </p:cNvPr>
-          <p:cNvSpPr>
-            <a:spLocks noGrp="1"/>
-          </p:cNvSpPr>
-          <p:nvPr>
-            <p:ph type="title"/>
-          </p:nvPr>
-        </p:nvSpPr>
-        <p:spPr/>
-        <p:txBody>
-          <a:bodyPr/>
-          <a:lstStyle/>
-          <a:p>
-            <a:r>
-              <a:rPr lang="en-US" dirty="0"/>
-              <a:t>Python Use Cases</a:t>
-            </a:r>
-          </a:p>
-        </p:txBody>
-      </p:sp>
-      <p:pic>
-        <p:nvPicPr>
-          <p:cNvPr id="5" name="Picture 4" descr="Graphical user interface, diagram&#10;&#10;Description automatically generated">
-            <a:extLst>
-              <a:ext uri="{FF2B5EF4-FFF2-40B4-BE49-F238E27FC236}">
-                <a16:creationId xmlns:a16="http://schemas.microsoft.com/office/drawing/2014/main" id="{B6859F11-CFB1-A447-8692-64430F758269}"/>
-              </a:ext>
-            </a:extLst>
-          </p:cNvPr>
-          <p:cNvPicPr>
-            <a:picLocks noChangeAspect="1"/>
-          </p:cNvPicPr>
-          <p:nvPr/>
-        </p:nvPicPr>
-        <p:blipFill>
-          <a:blip r:embed="rId2">
-            <a:extLst>
-              <a:ext uri="{837473B0-CC2E-450A-ABE3-18F120FF3D39}">
-                <a1611:picAttrSrcUrl xmlns:a1611="http://schemas.microsoft.com/office/drawing/2016/11/main" r:id="rId3"/>
-              </a:ext>
-            </a:extLst>
-          </a:blip>
-          <a:stretch>
-            <a:fillRect/>
-          </a:stretch>
-        </p:blipFill>
-        <p:spPr>
-          <a:xfrm>
-            <a:off x="691978" y="1921520"/>
-            <a:ext cx="2612768" cy="1737491"/>
-          </a:xfrm>
-          <a:prstGeom prst="rect">
-            <a:avLst/>
-          </a:prstGeom>
-        </p:spPr>
-      </p:pic>
-      <p:pic>
-        <p:nvPicPr>
-          <p:cNvPr id="7" name="Picture 6" descr="Graphical user interface&#10;&#10;Description automatically generated with medium confidence">
-            <a:extLst>
-              <a:ext uri="{FF2B5EF4-FFF2-40B4-BE49-F238E27FC236}">
-                <a16:creationId xmlns:a16="http://schemas.microsoft.com/office/drawing/2014/main" id="{A8A5B7EB-2265-0941-BDB6-98E034D2643F}"/>
-              </a:ext>
-            </a:extLst>
-          </p:cNvPr>
-          <p:cNvPicPr>
-            <a:picLocks noChangeAspect="1"/>
-          </p:cNvPicPr>
-          <p:nvPr/>
-        </p:nvPicPr>
-        <p:blipFill>
-          <a:blip r:embed="rId4">
-            <a:extLst>
-              <a:ext uri="{837473B0-CC2E-450A-ABE3-18F120FF3D39}">
-                <a1611:picAttrSrcUrl xmlns:a1611="http://schemas.microsoft.com/office/drawing/2016/11/main" r:id="rId5"/>
-              </a:ext>
-            </a:extLst>
-          </a:blip>
-          <a:stretch>
-            <a:fillRect/>
-          </a:stretch>
-        </p:blipFill>
-        <p:spPr>
-          <a:xfrm>
-            <a:off x="4552020" y="1921520"/>
-            <a:ext cx="3087960" cy="1737492"/>
-          </a:xfrm>
-          <a:prstGeom prst="rect">
-            <a:avLst/>
-          </a:prstGeom>
-        </p:spPr>
-      </p:pic>
-      <p:sp>
-        <p:nvSpPr>
-          <p:cNvPr id="8" name="TextBox 7">
-            <a:extLst>
-              <a:ext uri="{FF2B5EF4-FFF2-40B4-BE49-F238E27FC236}">
-                <a16:creationId xmlns:a16="http://schemas.microsoft.com/office/drawing/2014/main" id="{C4DF9851-C38D-A34B-A862-5D97F4F84641}"/>
-              </a:ext>
-            </a:extLst>
-          </p:cNvPr>
-          <p:cNvSpPr txBox="1"/>
-          <p:nvPr/>
-        </p:nvSpPr>
-        <p:spPr>
-          <a:xfrm>
-            <a:off x="0" y="6627168"/>
-            <a:ext cx="3938716" cy="230832"/>
-          </a:xfrm>
-          <a:prstGeom prst="rect">
-            <a:avLst/>
-          </a:prstGeom>
-          <a:noFill/>
-        </p:spPr>
-        <p:txBody>
-          <a:bodyPr wrap="square" rtlCol="0">
-            <a:spAutoFit/>
-          </a:bodyPr>
-          <a:lstStyle/>
-          <a:p>
-            <a:r>
-              <a:rPr lang="en-US" sz="900">
-                <a:hlinkClick r:id="rId5" tooltip="https://www.groundreport.com/get-better-roi-website-today/"/>
-              </a:rPr>
-              <a:t>This Photo</a:t>
-            </a:r>
-            <a:r>
-              <a:rPr lang="en-US" sz="900"/>
-              <a:t> by Unknown Author is licensed under </a:t>
-            </a:r>
-            <a:r>
-              <a:rPr lang="en-US" sz="900">
-                <a:hlinkClick r:id="rId6" tooltip="https://creativecommons.org/licenses/by-nc/3.0/"/>
-              </a:rPr>
-              <a:t>CC BY-NC</a:t>
-            </a:r>
-            <a:endParaRPr lang="en-US" sz="900"/>
-          </a:p>
-        </p:txBody>
-      </p:sp>
-      <p:pic>
-        <p:nvPicPr>
-          <p:cNvPr id="10" name="Picture 9" descr="Diagram&#10;&#10;Description automatically generated">
-            <a:extLst>
-              <a:ext uri="{FF2B5EF4-FFF2-40B4-BE49-F238E27FC236}">
-                <a16:creationId xmlns:a16="http://schemas.microsoft.com/office/drawing/2014/main" id="{3EF8B60E-D46B-0F40-BDD3-C71490D3F17A}"/>
-              </a:ext>
-            </a:extLst>
-          </p:cNvPr>
-          <p:cNvPicPr>
-            <a:picLocks noChangeAspect="1"/>
-          </p:cNvPicPr>
-          <p:nvPr/>
-        </p:nvPicPr>
-        <p:blipFill>
-          <a:blip r:embed="rId7">
-            <a:extLst>
-              <a:ext uri="{837473B0-CC2E-450A-ABE3-18F120FF3D39}">
-                <a1611:picAttrSrcUrl xmlns:a1611="http://schemas.microsoft.com/office/drawing/2016/11/main" r:id="rId8"/>
-              </a:ext>
-            </a:extLst>
-          </a:blip>
-          <a:stretch>
-            <a:fillRect/>
-          </a:stretch>
-        </p:blipFill>
-        <p:spPr>
-          <a:xfrm>
-            <a:off x="8887254" y="1921519"/>
-            <a:ext cx="2767775" cy="1737491"/>
-          </a:xfrm>
-          <a:prstGeom prst="rect">
-            <a:avLst/>
-          </a:prstGeom>
-        </p:spPr>
-      </p:pic>
-      <p:sp>
-        <p:nvSpPr>
-          <p:cNvPr id="11" name="TextBox 10">
-            <a:extLst>
-              <a:ext uri="{FF2B5EF4-FFF2-40B4-BE49-F238E27FC236}">
-                <a16:creationId xmlns:a16="http://schemas.microsoft.com/office/drawing/2014/main" id="{3551A606-F92C-2444-BE3D-B3DEA867859A}"/>
-              </a:ext>
-            </a:extLst>
-          </p:cNvPr>
-          <p:cNvSpPr txBox="1"/>
-          <p:nvPr/>
-        </p:nvSpPr>
-        <p:spPr>
-          <a:xfrm>
-            <a:off x="0" y="6396336"/>
-            <a:ext cx="3249827" cy="230832"/>
-          </a:xfrm>
-          <a:prstGeom prst="rect">
-            <a:avLst/>
-          </a:prstGeom>
-          <a:noFill/>
-        </p:spPr>
-        <p:txBody>
-          <a:bodyPr wrap="square" rtlCol="0">
-            <a:spAutoFit/>
-          </a:bodyPr>
-          <a:lstStyle/>
-          <a:p>
-            <a:r>
-              <a:rPr lang="en-US" sz="900" dirty="0">
-                <a:hlinkClick r:id="rId8" tooltip="https://geobrava.wordpress.com/2019/01/05/ai-and-fintech-growing-influence-on-financial-data-in-2019/"/>
-              </a:rPr>
-              <a:t>This Photo</a:t>
-            </a:r>
-            <a:r>
-              <a:rPr lang="en-US" sz="900" dirty="0"/>
-              <a:t> by Unknown Author is licensed under </a:t>
-            </a:r>
-            <a:r>
-              <a:rPr lang="en-US" sz="900" dirty="0">
-                <a:hlinkClick r:id="rId9" tooltip="https://creativecommons.org/licenses/by-sa/3.0/"/>
-              </a:rPr>
-              <a:t>CC BY-SA</a:t>
-            </a:r>
-            <a:endParaRPr lang="en-US" sz="900" dirty="0"/>
-          </a:p>
-        </p:txBody>
-      </p:sp>
-      <p:sp>
-        <p:nvSpPr>
-          <p:cNvPr id="13" name="TextBox 12">
-            <a:extLst>
-              <a:ext uri="{FF2B5EF4-FFF2-40B4-BE49-F238E27FC236}">
-                <a16:creationId xmlns:a16="http://schemas.microsoft.com/office/drawing/2014/main" id="{BE1C5246-CC78-6A40-8D0E-345F60C4B178}"/>
-              </a:ext>
-            </a:extLst>
-          </p:cNvPr>
-          <p:cNvSpPr txBox="1"/>
-          <p:nvPr/>
-        </p:nvSpPr>
-        <p:spPr>
-          <a:xfrm>
-            <a:off x="838200" y="3835763"/>
-            <a:ext cx="3249416" cy="646331"/>
-          </a:xfrm>
-          <a:prstGeom prst="rect">
-            <a:avLst/>
-          </a:prstGeom>
-          <a:noFill/>
-        </p:spPr>
-        <p:txBody>
-          <a:bodyPr wrap="none" rtlCol="0">
-            <a:spAutoFit/>
-          </a:bodyPr>
-          <a:lstStyle/>
-          <a:p>
-            <a:pPr marL="285750" indent="-285750">
-              <a:buFont typeface="Arial" panose="020B0604020202020204" pitchFamily="34" charset="0"/>
-              <a:buChar char="•"/>
-            </a:pPr>
-            <a:r>
-              <a:rPr lang="en-US" dirty="0"/>
-              <a:t>Data Analysis &amp; Visualizations</a:t>
-            </a:r>
-          </a:p>
-          <a:p>
-            <a:pPr marL="285750" indent="-285750">
-              <a:buFont typeface="Arial" panose="020B0604020202020204" pitchFamily="34" charset="0"/>
-              <a:buChar char="•"/>
-            </a:pPr>
-            <a:r>
-              <a:rPr lang="en-US" dirty="0"/>
-              <a:t>Web Scraping</a:t>
-            </a:r>
-          </a:p>
-        </p:txBody>
-      </p:sp>
-      <p:sp>
-        <p:nvSpPr>
-          <p:cNvPr id="14" name="TextBox 13">
-            <a:extLst>
-              <a:ext uri="{FF2B5EF4-FFF2-40B4-BE49-F238E27FC236}">
-                <a16:creationId xmlns:a16="http://schemas.microsoft.com/office/drawing/2014/main" id="{10A217D0-8CB2-D644-8832-FE3F22E7E7B7}"/>
-              </a:ext>
-            </a:extLst>
-          </p:cNvPr>
-          <p:cNvSpPr txBox="1"/>
-          <p:nvPr/>
-        </p:nvSpPr>
-        <p:spPr>
-          <a:xfrm>
-            <a:off x="4552020" y="3835763"/>
-            <a:ext cx="2227341" cy="923330"/>
-          </a:xfrm>
-          <a:prstGeom prst="rect">
-            <a:avLst/>
-          </a:prstGeom>
-          <a:noFill/>
-        </p:spPr>
-        <p:txBody>
-          <a:bodyPr wrap="none" rtlCol="0">
-            <a:spAutoFit/>
-          </a:bodyPr>
-          <a:lstStyle/>
-          <a:p>
-            <a:pPr marL="285750" indent="-285750">
-              <a:buFont typeface="Arial" panose="020B0604020202020204" pitchFamily="34" charset="0"/>
-              <a:buChar char="•"/>
-            </a:pPr>
-            <a:r>
-              <a:rPr lang="en-US" dirty="0"/>
-              <a:t>Web Development</a:t>
-            </a:r>
-          </a:p>
-          <a:p>
-            <a:pPr marL="285750" indent="-285750">
-              <a:buFont typeface="Arial" panose="020B0604020202020204" pitchFamily="34" charset="0"/>
-              <a:buChar char="•"/>
-            </a:pPr>
-            <a:r>
-              <a:rPr lang="en-US" dirty="0"/>
-              <a:t>Software Testing</a:t>
-            </a:r>
-          </a:p>
-          <a:p>
-            <a:pPr marL="285750" indent="-285750">
-              <a:buFont typeface="Arial" panose="020B0604020202020204" pitchFamily="34" charset="0"/>
-              <a:buChar char="•"/>
-            </a:pPr>
-            <a:r>
-              <a:rPr lang="en-US" dirty="0"/>
-              <a:t>Automation</a:t>
-            </a:r>
-          </a:p>
-        </p:txBody>
-      </p:sp>
-      <p:sp>
-        <p:nvSpPr>
-          <p:cNvPr id="15" name="TextBox 14">
-            <a:extLst>
-              <a:ext uri="{FF2B5EF4-FFF2-40B4-BE49-F238E27FC236}">
-                <a16:creationId xmlns:a16="http://schemas.microsoft.com/office/drawing/2014/main" id="{A20B1D2C-7B11-B24A-99E8-E33F97EA0540}"/>
-              </a:ext>
-            </a:extLst>
-          </p:cNvPr>
-          <p:cNvSpPr txBox="1"/>
-          <p:nvPr/>
-        </p:nvSpPr>
-        <p:spPr>
-          <a:xfrm>
-            <a:off x="8887254" y="3835763"/>
-            <a:ext cx="2899512" cy="923330"/>
-          </a:xfrm>
-          <a:prstGeom prst="rect">
-            <a:avLst/>
-          </a:prstGeom>
-          <a:noFill/>
-        </p:spPr>
-        <p:txBody>
-          <a:bodyPr wrap="none" rtlCol="0">
-            <a:spAutoFit/>
-          </a:bodyPr>
-          <a:lstStyle/>
-          <a:p>
-            <a:pPr marL="285750" indent="-285750">
-              <a:buFont typeface="Arial" panose="020B0604020202020204" pitchFamily="34" charset="0"/>
-              <a:buChar char="•"/>
-            </a:pPr>
-            <a:r>
-              <a:rPr lang="en-US" dirty="0"/>
-              <a:t>Data Science</a:t>
-            </a:r>
-          </a:p>
-          <a:p>
-            <a:pPr marL="285750" indent="-285750">
-              <a:buFont typeface="Arial" panose="020B0604020202020204" pitchFamily="34" charset="0"/>
-              <a:buChar char="•"/>
-            </a:pPr>
-            <a:r>
-              <a:rPr lang="en-US" dirty="0"/>
-              <a:t>Machine Learning</a:t>
-            </a:r>
-          </a:p>
-          <a:p>
-            <a:pPr marL="285750" indent="-285750">
-              <a:buFont typeface="Arial" panose="020B0604020202020204" pitchFamily="34" charset="0"/>
-              <a:buChar char="•"/>
-            </a:pPr>
-            <a:r>
-              <a:rPr lang="en-US" dirty="0"/>
-              <a:t>AI – NLP, Computer Vision</a:t>
-            </a:r>
-          </a:p>
-        </p:txBody>
-      </p:sp>
-    </p:spTree>
-    <p:extLst>
-      <p:ext uri="{BB962C8B-B14F-4D97-AF65-F5344CB8AC3E}">
-        <p14:creationId xmlns:p14="http://schemas.microsoft.com/office/powerpoint/2010/main" val="1786801132"/>
-      </p:ext>
-    </p:extLst>
-  </p:cSld>
-  <p:clrMapOvr>
-    <a:masterClrMapping/>
-  </p:clrMapOvr>
-</p:sld>
-</file>
-
-<file path=ppt/slides/slide14.xml><?xml version="1.0" encoding="utf-8"?>
-<p:sld xmlns:a="http://schemas.openxmlformats.org/drawingml/2006/main" xmlns:r="http://schemas.openxmlformats.org/officeDocument/2006/relationships" xmlns:p="http://schemas.openxmlformats.org/presentationml/2006/main">
-  <p:cSld>
-    <p:spTree>
-      <p:nvGrpSpPr>
-        <p:cNvPr id="1" name=""/>
-        <p:cNvGrpSpPr/>
-        <p:nvPr/>
-      </p:nvGrpSpPr>
-      <p:grpSpPr>
-        <a:xfrm>
-          <a:off x="0" y="0"/>
-          <a:ext cx="0" cy="0"/>
-          <a:chOff x="0" y="0"/>
-          <a:chExt cx="0" cy="0"/>
-        </a:xfrm>
-      </p:grpSpPr>
-      <p:sp>
-        <p:nvSpPr>
-          <p:cNvPr id="2" name="Title 1">
-            <a:extLst>
-              <a:ext uri="{FF2B5EF4-FFF2-40B4-BE49-F238E27FC236}">
-                <a16:creationId xmlns:a16="http://schemas.microsoft.com/office/drawing/2014/main" id="{4CCE9DC7-2C15-454A-A058-349906F4C0E1}"/>
-              </a:ext>
-            </a:extLst>
-          </p:cNvPr>
-          <p:cNvSpPr>
-            <a:spLocks noGrp="1"/>
-          </p:cNvSpPr>
-          <p:nvPr>
-            <p:ph type="title"/>
-          </p:nvPr>
-        </p:nvSpPr>
-        <p:spPr>
-          <a:xfrm>
-            <a:off x="838200" y="2766218"/>
-            <a:ext cx="10515600" cy="1325563"/>
-          </a:xfrm>
-        </p:spPr>
-        <p:txBody>
-          <a:bodyPr/>
-          <a:lstStyle/>
-          <a:p>
-            <a:r>
-              <a:rPr lang="en-US" dirty="0"/>
-              <a:t>Let’s Install Python!</a:t>
-            </a:r>
-          </a:p>
-        </p:txBody>
-      </p:sp>
-    </p:spTree>
-    <p:extLst>
-      <p:ext uri="{BB962C8B-B14F-4D97-AF65-F5344CB8AC3E}">
-        <p14:creationId xmlns:p14="http://schemas.microsoft.com/office/powerpoint/2010/main" val="330286555"/>
       </p:ext>
     </p:extLst>
   </p:cSld>
@@ -6120,7 +6904,7 @@
           <p:cNvPr id="2" name="Title 1">
             <a:extLst>
               <a:ext uri="{FF2B5EF4-FFF2-40B4-BE49-F238E27FC236}">
-                <a16:creationId xmlns:a16="http://schemas.microsoft.com/office/drawing/2014/main" id="{4CCE9DC7-2C15-454A-A058-349906F4C0E1}"/>
+                <a16:creationId xmlns:a16="http://schemas.microsoft.com/office/drawing/2014/main" id="{5AB5C9B5-2896-5E4C-BE84-70167FA0DB32}"/>
               </a:ext>
             </a:extLst>
           </p:cNvPr>
@@ -6131,19 +6915,385 @@
             <p:ph type="title"/>
           </p:nvPr>
         </p:nvSpPr>
-        <p:spPr>
-          <a:xfrm>
-            <a:off x="838200" y="2766218"/>
-            <a:ext cx="10515600" cy="1325563"/>
-          </a:xfrm>
-        </p:spPr>
+        <p:spPr/>
         <p:txBody>
           <a:bodyPr/>
           <a:lstStyle/>
           <a:p>
             <a:r>
               <a:rPr lang="en-US" dirty="0"/>
-              <a:t>And a Code Editor!</a:t>
+              <a:t>Python Use Cases</a:t>
+            </a:r>
+          </a:p>
+        </p:txBody>
+      </p:sp>
+      <p:pic>
+        <p:nvPicPr>
+          <p:cNvPr id="5" name="Picture 4" descr="Graphical user interface, diagram&#10;&#10;Description automatically generated">
+            <a:extLst>
+              <a:ext uri="{FF2B5EF4-FFF2-40B4-BE49-F238E27FC236}">
+                <a16:creationId xmlns:a16="http://schemas.microsoft.com/office/drawing/2014/main" id="{B6859F11-CFB1-A447-8692-64430F758269}"/>
+              </a:ext>
+            </a:extLst>
+          </p:cNvPr>
+          <p:cNvPicPr>
+            <a:picLocks noChangeAspect="1"/>
+          </p:cNvPicPr>
+          <p:nvPr/>
+        </p:nvPicPr>
+        <p:blipFill>
+          <a:blip r:embed="rId2">
+            <a:extLst>
+              <a:ext uri="{837473B0-CC2E-450A-ABE3-18F120FF3D39}">
+                <a1611:picAttrSrcUrl xmlns:a1611="http://schemas.microsoft.com/office/drawing/2016/11/main" r:id="rId3"/>
+              </a:ext>
+            </a:extLst>
+          </a:blip>
+          <a:stretch>
+            <a:fillRect/>
+          </a:stretch>
+        </p:blipFill>
+        <p:spPr>
+          <a:xfrm>
+            <a:off x="691978" y="1921520"/>
+            <a:ext cx="2612768" cy="1737491"/>
+          </a:xfrm>
+          <a:prstGeom prst="rect">
+            <a:avLst/>
+          </a:prstGeom>
+        </p:spPr>
+      </p:pic>
+      <p:pic>
+        <p:nvPicPr>
+          <p:cNvPr id="7" name="Picture 6" descr="Graphical user interface&#10;&#10;Description automatically generated with medium confidence">
+            <a:extLst>
+              <a:ext uri="{FF2B5EF4-FFF2-40B4-BE49-F238E27FC236}">
+                <a16:creationId xmlns:a16="http://schemas.microsoft.com/office/drawing/2014/main" id="{A8A5B7EB-2265-0941-BDB6-98E034D2643F}"/>
+              </a:ext>
+            </a:extLst>
+          </p:cNvPr>
+          <p:cNvPicPr>
+            <a:picLocks noChangeAspect="1"/>
+          </p:cNvPicPr>
+          <p:nvPr/>
+        </p:nvPicPr>
+        <p:blipFill>
+          <a:blip r:embed="rId4">
+            <a:extLst>
+              <a:ext uri="{837473B0-CC2E-450A-ABE3-18F120FF3D39}">
+                <a1611:picAttrSrcUrl xmlns:a1611="http://schemas.microsoft.com/office/drawing/2016/11/main" r:id="rId5"/>
+              </a:ext>
+            </a:extLst>
+          </a:blip>
+          <a:stretch>
+            <a:fillRect/>
+          </a:stretch>
+        </p:blipFill>
+        <p:spPr>
+          <a:xfrm>
+            <a:off x="4552020" y="1921520"/>
+            <a:ext cx="3087960" cy="1737492"/>
+          </a:xfrm>
+          <a:prstGeom prst="rect">
+            <a:avLst/>
+          </a:prstGeom>
+        </p:spPr>
+      </p:pic>
+      <p:sp>
+        <p:nvSpPr>
+          <p:cNvPr id="8" name="TextBox 7">
+            <a:extLst>
+              <a:ext uri="{FF2B5EF4-FFF2-40B4-BE49-F238E27FC236}">
+                <a16:creationId xmlns:a16="http://schemas.microsoft.com/office/drawing/2014/main" id="{C4DF9851-C38D-A34B-A862-5D97F4F84641}"/>
+              </a:ext>
+            </a:extLst>
+          </p:cNvPr>
+          <p:cNvSpPr txBox="1"/>
+          <p:nvPr/>
+        </p:nvSpPr>
+        <p:spPr>
+          <a:xfrm>
+            <a:off x="0" y="6627168"/>
+            <a:ext cx="3938716" cy="230832"/>
+          </a:xfrm>
+          <a:prstGeom prst="rect">
+            <a:avLst/>
+          </a:prstGeom>
+          <a:noFill/>
+        </p:spPr>
+        <p:txBody>
+          <a:bodyPr wrap="square" rtlCol="0">
+            <a:spAutoFit/>
+          </a:bodyPr>
+          <a:lstStyle/>
+          <a:p>
+            <a:r>
+              <a:rPr lang="en-US" sz="900">
+                <a:hlinkClick r:id="rId5" tooltip="https://www.groundreport.com/get-better-roi-website-today/"/>
+              </a:rPr>
+              <a:t>This Photo</a:t>
+            </a:r>
+            <a:r>
+              <a:rPr lang="en-US" sz="900"/>
+              <a:t> by Unknown Author is licensed under </a:t>
+            </a:r>
+            <a:r>
+              <a:rPr lang="en-US" sz="900">
+                <a:hlinkClick r:id="rId6" tooltip="https://creativecommons.org/licenses/by-nc/3.0/"/>
+              </a:rPr>
+              <a:t>CC BY-NC</a:t>
+            </a:r>
+            <a:endParaRPr lang="en-US" sz="900"/>
+          </a:p>
+        </p:txBody>
+      </p:sp>
+      <p:pic>
+        <p:nvPicPr>
+          <p:cNvPr id="10" name="Picture 9" descr="Diagram&#10;&#10;Description automatically generated">
+            <a:extLst>
+              <a:ext uri="{FF2B5EF4-FFF2-40B4-BE49-F238E27FC236}">
+                <a16:creationId xmlns:a16="http://schemas.microsoft.com/office/drawing/2014/main" id="{3EF8B60E-D46B-0F40-BDD3-C71490D3F17A}"/>
+              </a:ext>
+            </a:extLst>
+          </p:cNvPr>
+          <p:cNvPicPr>
+            <a:picLocks noChangeAspect="1"/>
+          </p:cNvPicPr>
+          <p:nvPr/>
+        </p:nvPicPr>
+        <p:blipFill>
+          <a:blip r:embed="rId7">
+            <a:extLst>
+              <a:ext uri="{837473B0-CC2E-450A-ABE3-18F120FF3D39}">
+                <a1611:picAttrSrcUrl xmlns:a1611="http://schemas.microsoft.com/office/drawing/2016/11/main" r:id="rId8"/>
+              </a:ext>
+            </a:extLst>
+          </a:blip>
+          <a:stretch>
+            <a:fillRect/>
+          </a:stretch>
+        </p:blipFill>
+        <p:spPr>
+          <a:xfrm>
+            <a:off x="8887254" y="1921519"/>
+            <a:ext cx="2767775" cy="1737491"/>
+          </a:xfrm>
+          <a:prstGeom prst="rect">
+            <a:avLst/>
+          </a:prstGeom>
+        </p:spPr>
+      </p:pic>
+      <p:sp>
+        <p:nvSpPr>
+          <p:cNvPr id="11" name="TextBox 10">
+            <a:extLst>
+              <a:ext uri="{FF2B5EF4-FFF2-40B4-BE49-F238E27FC236}">
+                <a16:creationId xmlns:a16="http://schemas.microsoft.com/office/drawing/2014/main" id="{3551A606-F92C-2444-BE3D-B3DEA867859A}"/>
+              </a:ext>
+            </a:extLst>
+          </p:cNvPr>
+          <p:cNvSpPr txBox="1"/>
+          <p:nvPr/>
+        </p:nvSpPr>
+        <p:spPr>
+          <a:xfrm>
+            <a:off x="0" y="6396336"/>
+            <a:ext cx="3249827" cy="230832"/>
+          </a:xfrm>
+          <a:prstGeom prst="rect">
+            <a:avLst/>
+          </a:prstGeom>
+          <a:noFill/>
+        </p:spPr>
+        <p:txBody>
+          <a:bodyPr wrap="square" rtlCol="0">
+            <a:spAutoFit/>
+          </a:bodyPr>
+          <a:lstStyle/>
+          <a:p>
+            <a:r>
+              <a:rPr lang="en-US" sz="900" dirty="0">
+                <a:hlinkClick r:id="rId8" tooltip="https://geobrava.wordpress.com/2019/01/05/ai-and-fintech-growing-influence-on-financial-data-in-2019/"/>
+              </a:rPr>
+              <a:t>This Photo</a:t>
+            </a:r>
+            <a:r>
+              <a:rPr lang="en-US" sz="900" dirty="0"/>
+              <a:t> by Unknown Author is licensed under </a:t>
+            </a:r>
+            <a:r>
+              <a:rPr lang="en-US" sz="900" dirty="0">
+                <a:hlinkClick r:id="rId9" tooltip="https://creativecommons.org/licenses/by-sa/3.0/"/>
+              </a:rPr>
+              <a:t>CC BY-SA</a:t>
+            </a:r>
+            <a:endParaRPr lang="en-US" sz="900" dirty="0"/>
+          </a:p>
+        </p:txBody>
+      </p:sp>
+      <p:sp>
+        <p:nvSpPr>
+          <p:cNvPr id="13" name="TextBox 12">
+            <a:extLst>
+              <a:ext uri="{FF2B5EF4-FFF2-40B4-BE49-F238E27FC236}">
+                <a16:creationId xmlns:a16="http://schemas.microsoft.com/office/drawing/2014/main" id="{BE1C5246-CC78-6A40-8D0E-345F60C4B178}"/>
+              </a:ext>
+            </a:extLst>
+          </p:cNvPr>
+          <p:cNvSpPr txBox="1"/>
+          <p:nvPr/>
+        </p:nvSpPr>
+        <p:spPr>
+          <a:xfrm>
+            <a:off x="838200" y="3835763"/>
+            <a:ext cx="3249416" cy="646331"/>
+          </a:xfrm>
+          <a:prstGeom prst="rect">
+            <a:avLst/>
+          </a:prstGeom>
+          <a:noFill/>
+        </p:spPr>
+        <p:txBody>
+          <a:bodyPr wrap="none" rtlCol="0">
+            <a:spAutoFit/>
+          </a:bodyPr>
+          <a:lstStyle/>
+          <a:p>
+            <a:pPr marL="285750" indent="-285750">
+              <a:buFont typeface="Arial" panose="020B0604020202020204" pitchFamily="34" charset="0"/>
+              <a:buChar char="•"/>
+            </a:pPr>
+            <a:r>
+              <a:rPr lang="en-US" dirty="0"/>
+              <a:t>Data Analysis &amp; Visualizations</a:t>
+            </a:r>
+          </a:p>
+          <a:p>
+            <a:pPr marL="285750" indent="-285750">
+              <a:buFont typeface="Arial" panose="020B0604020202020204" pitchFamily="34" charset="0"/>
+              <a:buChar char="•"/>
+            </a:pPr>
+            <a:r>
+              <a:rPr lang="en-US" dirty="0"/>
+              <a:t>Web Scraping</a:t>
+            </a:r>
+          </a:p>
+        </p:txBody>
+      </p:sp>
+      <p:sp>
+        <p:nvSpPr>
+          <p:cNvPr id="14" name="TextBox 13">
+            <a:extLst>
+              <a:ext uri="{FF2B5EF4-FFF2-40B4-BE49-F238E27FC236}">
+                <a16:creationId xmlns:a16="http://schemas.microsoft.com/office/drawing/2014/main" id="{10A217D0-8CB2-D644-8832-FE3F22E7E7B7}"/>
+              </a:ext>
+            </a:extLst>
+          </p:cNvPr>
+          <p:cNvSpPr txBox="1"/>
+          <p:nvPr/>
+        </p:nvSpPr>
+        <p:spPr>
+          <a:xfrm>
+            <a:off x="4552020" y="3835763"/>
+            <a:ext cx="2227341" cy="923330"/>
+          </a:xfrm>
+          <a:prstGeom prst="rect">
+            <a:avLst/>
+          </a:prstGeom>
+          <a:noFill/>
+        </p:spPr>
+        <p:txBody>
+          <a:bodyPr wrap="none" rtlCol="0">
+            <a:spAutoFit/>
+          </a:bodyPr>
+          <a:lstStyle/>
+          <a:p>
+            <a:pPr marL="285750" indent="-285750">
+              <a:buFont typeface="Arial" panose="020B0604020202020204" pitchFamily="34" charset="0"/>
+              <a:buChar char="•"/>
+            </a:pPr>
+            <a:r>
+              <a:rPr lang="en-US" dirty="0"/>
+              <a:t>Web Development</a:t>
+            </a:r>
+          </a:p>
+          <a:p>
+            <a:pPr marL="285750" indent="-285750">
+              <a:buFont typeface="Arial" panose="020B0604020202020204" pitchFamily="34" charset="0"/>
+              <a:buChar char="•"/>
+            </a:pPr>
+            <a:r>
+              <a:rPr lang="en-US" dirty="0"/>
+              <a:t>Software Testing</a:t>
+            </a:r>
+          </a:p>
+          <a:p>
+            <a:pPr marL="285750" indent="-285750">
+              <a:buFont typeface="Arial" panose="020B0604020202020204" pitchFamily="34" charset="0"/>
+              <a:buChar char="•"/>
+            </a:pPr>
+            <a:r>
+              <a:rPr lang="en-US" dirty="0"/>
+              <a:t>Automation</a:t>
+            </a:r>
+          </a:p>
+        </p:txBody>
+      </p:sp>
+      <p:sp>
+        <p:nvSpPr>
+          <p:cNvPr id="15" name="TextBox 14">
+            <a:extLst>
+              <a:ext uri="{FF2B5EF4-FFF2-40B4-BE49-F238E27FC236}">
+                <a16:creationId xmlns:a16="http://schemas.microsoft.com/office/drawing/2014/main" id="{A20B1D2C-7B11-B24A-99E8-E33F97EA0540}"/>
+              </a:ext>
+            </a:extLst>
+          </p:cNvPr>
+          <p:cNvSpPr txBox="1"/>
+          <p:nvPr/>
+        </p:nvSpPr>
+        <p:spPr>
+          <a:xfrm>
+            <a:off x="8887254" y="3835763"/>
+            <a:ext cx="2899512" cy="923330"/>
+          </a:xfrm>
+          <a:prstGeom prst="rect">
+            <a:avLst/>
+          </a:prstGeom>
+          <a:noFill/>
+        </p:spPr>
+        <p:txBody>
+          <a:bodyPr wrap="none" rtlCol="0">
+            <a:spAutoFit/>
+          </a:bodyPr>
+          <a:lstStyle/>
+          <a:p>
+            <a:pPr marL="285750" indent="-285750">
+              <a:buFont typeface="Arial" panose="020B0604020202020204" pitchFamily="34" charset="0"/>
+              <a:buChar char="•"/>
+            </a:pPr>
+            <a:r>
+              <a:rPr lang="en-US" dirty="0"/>
+              <a:t>Data Science</a:t>
+            </a:r>
+          </a:p>
+          <a:p>
+            <a:pPr marL="285750" indent="-285750">
+              <a:buFont typeface="Arial" panose="020B0604020202020204" pitchFamily="34" charset="0"/>
+              <a:buChar char="•"/>
+            </a:pPr>
+            <a:r>
+              <a:rPr lang="en-US" dirty="0"/>
+              <a:t>Machine Learning</a:t>
+            </a:r>
+          </a:p>
+          <a:p>
+            <a:pPr marL="285750" indent="-285750">
+              <a:buFont typeface="Arial" panose="020B0604020202020204" pitchFamily="34" charset="0"/>
+              <a:buChar char="•"/>
+            </a:pPr>
+            <a:r>
+              <a:rPr lang="en-US" dirty="0"/>
+              <a:t>AI – NLP, Computer Vision</a:t>
             </a:r>
           </a:p>
         </p:txBody>
@@ -6151,7 +7301,7 @@
     </p:spTree>
     <p:extLst>
       <p:ext uri="{BB962C8B-B14F-4D97-AF65-F5344CB8AC3E}">
-        <p14:creationId xmlns:p14="http://schemas.microsoft.com/office/powerpoint/2010/main" val="407716198"/>
+        <p14:creationId xmlns:p14="http://schemas.microsoft.com/office/powerpoint/2010/main" val="1786801132"/>
       </p:ext>
     </p:extLst>
   </p:cSld>
@@ -6178,6 +7328,132 @@
           <a:chExt cx="0" cy="0"/>
         </a:xfrm>
       </p:grpSpPr>
+      <p:sp>
+        <p:nvSpPr>
+          <p:cNvPr id="2" name="Title 1">
+            <a:extLst>
+              <a:ext uri="{FF2B5EF4-FFF2-40B4-BE49-F238E27FC236}">
+                <a16:creationId xmlns:a16="http://schemas.microsoft.com/office/drawing/2014/main" id="{4CCE9DC7-2C15-454A-A058-349906F4C0E1}"/>
+              </a:ext>
+            </a:extLst>
+          </p:cNvPr>
+          <p:cNvSpPr>
+            <a:spLocks noGrp="1"/>
+          </p:cNvSpPr>
+          <p:nvPr>
+            <p:ph type="title"/>
+          </p:nvPr>
+        </p:nvSpPr>
+        <p:spPr>
+          <a:xfrm>
+            <a:off x="838200" y="2766218"/>
+            <a:ext cx="10515600" cy="1325563"/>
+          </a:xfrm>
+        </p:spPr>
+        <p:txBody>
+          <a:bodyPr/>
+          <a:lstStyle/>
+          <a:p>
+            <a:r>
+              <a:rPr lang="en-US" dirty="0"/>
+              <a:t>Let’s Install Python!</a:t>
+            </a:r>
+          </a:p>
+        </p:txBody>
+      </p:sp>
+    </p:spTree>
+    <p:extLst>
+      <p:ext uri="{BB962C8B-B14F-4D97-AF65-F5344CB8AC3E}">
+        <p14:creationId xmlns:p14="http://schemas.microsoft.com/office/powerpoint/2010/main" val="330286555"/>
+      </p:ext>
+    </p:extLst>
+  </p:cSld>
+  <p:clrMapOvr>
+    <a:masterClrMapping/>
+  </p:clrMapOvr>
+</p:sld>
+</file>
+
+<file path=ppt/slides/slide17.xml><?xml version="1.0" encoding="utf-8"?>
+<p:sld xmlns:a="http://schemas.openxmlformats.org/drawingml/2006/main" xmlns:r="http://schemas.openxmlformats.org/officeDocument/2006/relationships" xmlns:p="http://schemas.openxmlformats.org/presentationml/2006/main">
+  <p:cSld>
+    <p:spTree>
+      <p:nvGrpSpPr>
+        <p:cNvPr id="1" name=""/>
+        <p:cNvGrpSpPr/>
+        <p:nvPr/>
+      </p:nvGrpSpPr>
+      <p:grpSpPr>
+        <a:xfrm>
+          <a:off x="0" y="0"/>
+          <a:ext cx="0" cy="0"/>
+          <a:chOff x="0" y="0"/>
+          <a:chExt cx="0" cy="0"/>
+        </a:xfrm>
+      </p:grpSpPr>
+      <p:sp>
+        <p:nvSpPr>
+          <p:cNvPr id="2" name="Title 1">
+            <a:extLst>
+              <a:ext uri="{FF2B5EF4-FFF2-40B4-BE49-F238E27FC236}">
+                <a16:creationId xmlns:a16="http://schemas.microsoft.com/office/drawing/2014/main" id="{4CCE9DC7-2C15-454A-A058-349906F4C0E1}"/>
+              </a:ext>
+            </a:extLst>
+          </p:cNvPr>
+          <p:cNvSpPr>
+            <a:spLocks noGrp="1"/>
+          </p:cNvSpPr>
+          <p:nvPr>
+            <p:ph type="title"/>
+          </p:nvPr>
+        </p:nvSpPr>
+        <p:spPr>
+          <a:xfrm>
+            <a:off x="838200" y="2766218"/>
+            <a:ext cx="10515600" cy="1325563"/>
+          </a:xfrm>
+        </p:spPr>
+        <p:txBody>
+          <a:bodyPr/>
+          <a:lstStyle/>
+          <a:p>
+            <a:r>
+              <a:rPr lang="en-US" dirty="0"/>
+              <a:t>And a Code Editor!</a:t>
+            </a:r>
+          </a:p>
+        </p:txBody>
+      </p:sp>
+    </p:spTree>
+    <p:extLst>
+      <p:ext uri="{BB962C8B-B14F-4D97-AF65-F5344CB8AC3E}">
+        <p14:creationId xmlns:p14="http://schemas.microsoft.com/office/powerpoint/2010/main" val="407716198"/>
+      </p:ext>
+    </p:extLst>
+  </p:cSld>
+  <p:clrMapOvr>
+    <a:masterClrMapping/>
+  </p:clrMapOvr>
+</p:sld>
+</file>
+
+<file path=ppt/slides/slide18.xml><?xml version="1.0" encoding="utf-8"?>
+<p:sld xmlns:a="http://schemas.openxmlformats.org/drawingml/2006/main" xmlns:r="http://schemas.openxmlformats.org/officeDocument/2006/relationships" xmlns:p="http://schemas.openxmlformats.org/presentationml/2006/main">
+  <p:cSld>
+    <p:spTree>
+      <p:nvGrpSpPr>
+        <p:cNvPr id="1" name=""/>
+        <p:cNvGrpSpPr/>
+        <p:nvPr/>
+      </p:nvGrpSpPr>
+      <p:grpSpPr>
+        <a:xfrm>
+          <a:off x="0" y="0"/>
+          <a:ext cx="0" cy="0"/>
+          <a:chOff x="0" y="0"/>
+          <a:chExt cx="0" cy="0"/>
+        </a:xfrm>
+      </p:grpSpPr>
       <p:pic>
         <p:nvPicPr>
           <p:cNvPr id="6" name="Picture 5" descr="Timeline&#10;&#10;Description automatically generated with medium confidence">
@@ -6339,7 +7615,7 @@
 </p:sld>
 </file>
 
-<file path=ppt/slides/slide17.xml><?xml version="1.0" encoding="utf-8"?>
+<file path=ppt/slides/slide19.xml><?xml version="1.0" encoding="utf-8"?>
 <p:sld xmlns:a="http://schemas.openxmlformats.org/drawingml/2006/main" xmlns:r="http://schemas.openxmlformats.org/officeDocument/2006/relationships" xmlns:p="http://schemas.openxmlformats.org/presentationml/2006/main">
   <p:cSld>
     <p:spTree>
@@ -6614,7 +7890,7 @@
             </a:pPr>
             <a:r>
               <a:rPr lang="en-US" dirty="0"/>
-              <a:t>Course Completion</a:t>
+              <a:t>Course Completion and Project Demo</a:t>
             </a:r>
           </a:p>
         </p:txBody>
@@ -6978,7 +8254,7 @@
           <p:cNvPr id="2" name="Title 1">
             <a:extLst>
               <a:ext uri="{FF2B5EF4-FFF2-40B4-BE49-F238E27FC236}">
-                <a16:creationId xmlns:a16="http://schemas.microsoft.com/office/drawing/2014/main" id="{8ACD25E2-97CF-5642-A8BC-A831DB818692}"/>
+                <a16:creationId xmlns:a16="http://schemas.microsoft.com/office/drawing/2014/main" id="{C36317D2-564A-B246-B845-7A1B1D2C23E8}"/>
               </a:ext>
             </a:extLst>
           </p:cNvPr>
@@ -6994,19 +8270,20 @@
           <a:bodyPr/>
           <a:lstStyle/>
           <a:p>
+            <a:pPr algn="ctr"/>
             <a:r>
               <a:rPr lang="en-US" dirty="0"/>
-              <a:t>Enter Programming</a:t>
-            </a:r>
-          </a:p>
-        </p:txBody>
-      </p:sp>
-      <p:sp>
-        <p:nvSpPr>
-          <p:cNvPr id="3" name="Text Placeholder 2">
-            <a:extLst>
-              <a:ext uri="{FF2B5EF4-FFF2-40B4-BE49-F238E27FC236}">
-                <a16:creationId xmlns:a16="http://schemas.microsoft.com/office/drawing/2014/main" id="{AE3740B8-C0E4-4642-83E6-340940CA010B}"/>
+              <a:t>Course Aim</a:t>
+            </a:r>
+          </a:p>
+        </p:txBody>
+      </p:sp>
+      <p:sp>
+        <p:nvSpPr>
+          <p:cNvPr id="3" name="Content Placeholder 2">
+            <a:extLst>
+              <a:ext uri="{FF2B5EF4-FFF2-40B4-BE49-F238E27FC236}">
+                <a16:creationId xmlns:a16="http://schemas.microsoft.com/office/drawing/2014/main" id="{4EA049E9-C0DE-E44D-81CE-3D7DB05E1408}"/>
               </a:ext>
             </a:extLst>
           </p:cNvPr>
@@ -7014,7 +8291,7 @@
             <a:spLocks noGrp="1"/>
           </p:cNvSpPr>
           <p:nvPr>
-            <p:ph type="body" idx="1"/>
+            <p:ph idx="1"/>
           </p:nvPr>
         </p:nvSpPr>
         <p:spPr/>
@@ -7022,53 +8299,67 @@
           <a:bodyPr/>
           <a:lstStyle/>
           <a:p>
+            <a:pPr marL="514350" indent="-514350">
+              <a:buFont typeface="+mj-lt"/>
+              <a:buAutoNum type="arabicPeriod"/>
+            </a:pPr>
             <a:r>
               <a:rPr lang="en-US" dirty="0"/>
-              <a:t>Today begins your journey</a:t>
-            </a:r>
-          </a:p>
-        </p:txBody>
-      </p:sp>
-      <p:pic>
-        <p:nvPicPr>
-          <p:cNvPr id="5" name="Picture 4" descr="A picture containing text, person, person&#10;&#10;Description automatically generated">
-            <a:extLst>
-              <a:ext uri="{FF2B5EF4-FFF2-40B4-BE49-F238E27FC236}">
-                <a16:creationId xmlns:a16="http://schemas.microsoft.com/office/drawing/2014/main" id="{DDCB0D06-6F3A-C04F-9415-A4A0B0A218CD}"/>
-              </a:ext>
-            </a:extLst>
-          </p:cNvPr>
-          <p:cNvPicPr>
-            <a:picLocks noChangeAspect="1"/>
-          </p:cNvPicPr>
-          <p:nvPr/>
-        </p:nvPicPr>
-        <p:blipFill>
-          <a:blip r:embed="rId2">
-            <a:extLst>
-              <a:ext uri="{837473B0-CC2E-450A-ABE3-18F120FF3D39}">
-                <a1611:picAttrSrcUrl xmlns:a1611="http://schemas.microsoft.com/office/drawing/2016/11/main" r:id="rId3"/>
-              </a:ext>
-            </a:extLst>
-          </a:blip>
-          <a:stretch>
-            <a:fillRect/>
-          </a:stretch>
-        </p:blipFill>
-        <p:spPr>
-          <a:xfrm>
-            <a:off x="6591328" y="934006"/>
-            <a:ext cx="5322555" cy="4589463"/>
-          </a:xfrm>
-          <a:prstGeom prst="rect">
-            <a:avLst/>
-          </a:prstGeom>
-        </p:spPr>
-      </p:pic>
+              <a:t>Understand the fundamental concepts of programming</a:t>
+            </a:r>
+          </a:p>
+          <a:p>
+            <a:pPr marL="514350" indent="-514350">
+              <a:buFont typeface="+mj-lt"/>
+              <a:buAutoNum type="arabicPeriod"/>
+            </a:pPr>
+            <a:r>
+              <a:rPr lang="en-US" dirty="0"/>
+              <a:t>Obtain familiarity with Python</a:t>
+            </a:r>
+          </a:p>
+          <a:p>
+            <a:pPr marL="514350" indent="-514350">
+              <a:buFont typeface="+mj-lt"/>
+              <a:buAutoNum type="arabicPeriod"/>
+            </a:pPr>
+            <a:r>
+              <a:rPr lang="en-US" dirty="0"/>
+              <a:t>Equip students with skills to enable them to take their own projects independently</a:t>
+            </a:r>
+          </a:p>
+          <a:p>
+            <a:pPr marL="514350" indent="-514350">
+              <a:buFont typeface="+mj-lt"/>
+              <a:buAutoNum type="arabicPeriod"/>
+            </a:pPr>
+            <a:r>
+              <a:rPr lang="en-US" dirty="0"/>
+              <a:t>Equip students with tools to showcase their skills to future employers</a:t>
+            </a:r>
+          </a:p>
+          <a:p>
+            <a:pPr marL="514350" indent="-514350">
+              <a:buFont typeface="+mj-lt"/>
+              <a:buAutoNum type="arabicPeriod"/>
+            </a:pPr>
+            <a:r>
+              <a:rPr lang="en-US" dirty="0"/>
+              <a:t>Allow students to ”think like a programmer”</a:t>
+            </a:r>
+          </a:p>
+          <a:p>
+            <a:pPr marL="0" indent="0">
+              <a:buNone/>
+            </a:pPr>
+            <a:endParaRPr lang="en-US" dirty="0"/>
+          </a:p>
+        </p:txBody>
+      </p:sp>
     </p:spTree>
     <p:extLst>
       <p:ext uri="{BB962C8B-B14F-4D97-AF65-F5344CB8AC3E}">
-        <p14:creationId xmlns:p14="http://schemas.microsoft.com/office/powerpoint/2010/main" val="1418746169"/>
+        <p14:creationId xmlns:p14="http://schemas.microsoft.com/office/powerpoint/2010/main" val="2509224837"/>
       </p:ext>
     </p:extLst>
   </p:cSld>
@@ -7100,6 +8391,239 @@
           <p:cNvPr id="2" name="Title 1">
             <a:extLst>
               <a:ext uri="{FF2B5EF4-FFF2-40B4-BE49-F238E27FC236}">
+                <a16:creationId xmlns:a16="http://schemas.microsoft.com/office/drawing/2014/main" id="{40338E93-80E0-0E4E-95D3-13975E62BD3B}"/>
+              </a:ext>
+            </a:extLst>
+          </p:cNvPr>
+          <p:cNvSpPr>
+            <a:spLocks noGrp="1"/>
+          </p:cNvSpPr>
+          <p:nvPr>
+            <p:ph type="title"/>
+          </p:nvPr>
+        </p:nvSpPr>
+        <p:spPr/>
+        <p:txBody>
+          <a:bodyPr/>
+          <a:lstStyle/>
+          <a:p>
+            <a:pPr algn="ctr"/>
+            <a:r>
+              <a:rPr lang="en-US" dirty="0"/>
+              <a:t>Today’s Class</a:t>
+            </a:r>
+          </a:p>
+        </p:txBody>
+      </p:sp>
+      <p:sp>
+        <p:nvSpPr>
+          <p:cNvPr id="3" name="Content Placeholder 2">
+            <a:extLst>
+              <a:ext uri="{FF2B5EF4-FFF2-40B4-BE49-F238E27FC236}">
+                <a16:creationId xmlns:a16="http://schemas.microsoft.com/office/drawing/2014/main" id="{9151A470-FF20-F848-B178-942D1C91114D}"/>
+              </a:ext>
+            </a:extLst>
+          </p:cNvPr>
+          <p:cNvSpPr>
+            <a:spLocks noGrp="1"/>
+          </p:cNvSpPr>
+          <p:nvPr>
+            <p:ph idx="1"/>
+          </p:nvPr>
+        </p:nvSpPr>
+        <p:spPr/>
+        <p:txBody>
+          <a:bodyPr/>
+          <a:lstStyle/>
+          <a:p>
+            <a:pPr marL="514350" indent="-514350">
+              <a:buFont typeface="+mj-lt"/>
+              <a:buAutoNum type="arabicPeriod"/>
+            </a:pPr>
+            <a:r>
+              <a:rPr lang="en-US" dirty="0"/>
+              <a:t>Introduction to Programming and Python</a:t>
+            </a:r>
+          </a:p>
+          <a:p>
+            <a:pPr marL="514350" indent="-514350">
+              <a:buFont typeface="+mj-lt"/>
+              <a:buAutoNum type="arabicPeriod"/>
+            </a:pPr>
+            <a:r>
+              <a:rPr lang="en-US" dirty="0"/>
+              <a:t>Installing Python and Code Editor</a:t>
+            </a:r>
+          </a:p>
+          <a:p>
+            <a:pPr marL="514350" indent="-514350">
+              <a:buFont typeface="+mj-lt"/>
+              <a:buAutoNum type="arabicPeriod"/>
+            </a:pPr>
+            <a:r>
+              <a:rPr lang="en-US" dirty="0"/>
+              <a:t>The Command Line Basics</a:t>
+            </a:r>
+          </a:p>
+        </p:txBody>
+      </p:sp>
+    </p:spTree>
+    <p:extLst>
+      <p:ext uri="{BB962C8B-B14F-4D97-AF65-F5344CB8AC3E}">
+        <p14:creationId xmlns:p14="http://schemas.microsoft.com/office/powerpoint/2010/main" val="3362366235"/>
+      </p:ext>
+    </p:extLst>
+  </p:cSld>
+  <p:clrMapOvr>
+    <a:masterClrMapping/>
+  </p:clrMapOvr>
+</p:sld>
+</file>
+
+<file path=ppt/slides/slide7.xml><?xml version="1.0" encoding="utf-8"?>
+<p:sld xmlns:a="http://schemas.openxmlformats.org/drawingml/2006/main" xmlns:r="http://schemas.openxmlformats.org/officeDocument/2006/relationships" xmlns:p="http://schemas.openxmlformats.org/presentationml/2006/main">
+  <p:cSld>
+    <p:spTree>
+      <p:nvGrpSpPr>
+        <p:cNvPr id="1" name=""/>
+        <p:cNvGrpSpPr/>
+        <p:nvPr/>
+      </p:nvGrpSpPr>
+      <p:grpSpPr>
+        <a:xfrm>
+          <a:off x="0" y="0"/>
+          <a:ext cx="0" cy="0"/>
+          <a:chOff x="0" y="0"/>
+          <a:chExt cx="0" cy="0"/>
+        </a:xfrm>
+      </p:grpSpPr>
+      <p:sp>
+        <p:nvSpPr>
+          <p:cNvPr id="2" name="Title 1">
+            <a:extLst>
+              <a:ext uri="{FF2B5EF4-FFF2-40B4-BE49-F238E27FC236}">
+                <a16:creationId xmlns:a16="http://schemas.microsoft.com/office/drawing/2014/main" id="{8ACD25E2-97CF-5642-A8BC-A831DB818692}"/>
+              </a:ext>
+            </a:extLst>
+          </p:cNvPr>
+          <p:cNvSpPr>
+            <a:spLocks noGrp="1"/>
+          </p:cNvSpPr>
+          <p:nvPr>
+            <p:ph type="title"/>
+          </p:nvPr>
+        </p:nvSpPr>
+        <p:spPr/>
+        <p:txBody>
+          <a:bodyPr/>
+          <a:lstStyle/>
+          <a:p>
+            <a:r>
+              <a:rPr lang="en-US" dirty="0"/>
+              <a:t>Enter Programming</a:t>
+            </a:r>
+          </a:p>
+        </p:txBody>
+      </p:sp>
+      <p:sp>
+        <p:nvSpPr>
+          <p:cNvPr id="3" name="Text Placeholder 2">
+            <a:extLst>
+              <a:ext uri="{FF2B5EF4-FFF2-40B4-BE49-F238E27FC236}">
+                <a16:creationId xmlns:a16="http://schemas.microsoft.com/office/drawing/2014/main" id="{AE3740B8-C0E4-4642-83E6-340940CA010B}"/>
+              </a:ext>
+            </a:extLst>
+          </p:cNvPr>
+          <p:cNvSpPr>
+            <a:spLocks noGrp="1"/>
+          </p:cNvSpPr>
+          <p:nvPr>
+            <p:ph type="body" idx="1"/>
+          </p:nvPr>
+        </p:nvSpPr>
+        <p:spPr/>
+        <p:txBody>
+          <a:bodyPr/>
+          <a:lstStyle/>
+          <a:p>
+            <a:r>
+              <a:rPr lang="en-US" dirty="0"/>
+              <a:t>Today begins your journey</a:t>
+            </a:r>
+          </a:p>
+        </p:txBody>
+      </p:sp>
+      <p:pic>
+        <p:nvPicPr>
+          <p:cNvPr id="5" name="Picture 4" descr="A picture containing text, person, person&#10;&#10;Description automatically generated">
+            <a:extLst>
+              <a:ext uri="{FF2B5EF4-FFF2-40B4-BE49-F238E27FC236}">
+                <a16:creationId xmlns:a16="http://schemas.microsoft.com/office/drawing/2014/main" id="{DDCB0D06-6F3A-C04F-9415-A4A0B0A218CD}"/>
+              </a:ext>
+            </a:extLst>
+          </p:cNvPr>
+          <p:cNvPicPr>
+            <a:picLocks noChangeAspect="1"/>
+          </p:cNvPicPr>
+          <p:nvPr/>
+        </p:nvPicPr>
+        <p:blipFill>
+          <a:blip r:embed="rId2">
+            <a:extLst>
+              <a:ext uri="{837473B0-CC2E-450A-ABE3-18F120FF3D39}">
+                <a1611:picAttrSrcUrl xmlns:a1611="http://schemas.microsoft.com/office/drawing/2016/11/main" r:id="rId3"/>
+              </a:ext>
+            </a:extLst>
+          </a:blip>
+          <a:stretch>
+            <a:fillRect/>
+          </a:stretch>
+        </p:blipFill>
+        <p:spPr>
+          <a:xfrm>
+            <a:off x="6591328" y="934006"/>
+            <a:ext cx="5322555" cy="4589463"/>
+          </a:xfrm>
+          <a:prstGeom prst="rect">
+            <a:avLst/>
+          </a:prstGeom>
+        </p:spPr>
+      </p:pic>
+    </p:spTree>
+    <p:extLst>
+      <p:ext uri="{BB962C8B-B14F-4D97-AF65-F5344CB8AC3E}">
+        <p14:creationId xmlns:p14="http://schemas.microsoft.com/office/powerpoint/2010/main" val="1418746169"/>
+      </p:ext>
+    </p:extLst>
+  </p:cSld>
+  <p:clrMapOvr>
+    <a:masterClrMapping/>
+  </p:clrMapOvr>
+</p:sld>
+</file>
+
+<file path=ppt/slides/slide8.xml><?xml version="1.0" encoding="utf-8"?>
+<p:sld xmlns:a="http://schemas.openxmlformats.org/drawingml/2006/main" xmlns:r="http://schemas.openxmlformats.org/officeDocument/2006/relationships" xmlns:p="http://schemas.openxmlformats.org/presentationml/2006/main">
+  <p:cSld>
+    <p:spTree>
+      <p:nvGrpSpPr>
+        <p:cNvPr id="1" name=""/>
+        <p:cNvGrpSpPr/>
+        <p:nvPr/>
+      </p:nvGrpSpPr>
+      <p:grpSpPr>
+        <a:xfrm>
+          <a:off x="0" y="0"/>
+          <a:ext cx="0" cy="0"/>
+          <a:chOff x="0" y="0"/>
+          <a:chExt cx="0" cy="0"/>
+        </a:xfrm>
+      </p:grpSpPr>
+      <p:sp>
+        <p:nvSpPr>
+          <p:cNvPr id="2" name="Title 1">
+            <a:extLst>
+              <a:ext uri="{FF2B5EF4-FFF2-40B4-BE49-F238E27FC236}">
                 <a16:creationId xmlns:a16="http://schemas.microsoft.com/office/drawing/2014/main" id="{2823B3E3-C550-FE4A-81F6-AAABEBFC647E}"/>
               </a:ext>
             </a:extLst>
@@ -7460,7 +8984,7 @@
 </p:sld>
 </file>
 
-<file path=ppt/slides/slide7.xml><?xml version="1.0" encoding="utf-8"?>
+<file path=ppt/slides/slide9.xml><?xml version="1.0" encoding="utf-8"?>
 <p:sld xmlns:a="http://schemas.openxmlformats.org/drawingml/2006/main" xmlns:r="http://schemas.openxmlformats.org/officeDocument/2006/relationships" xmlns:p="http://schemas.openxmlformats.org/presentationml/2006/main">
   <p:cSld>
     <p:bg>
@@ -8240,840 +9764,6 @@
     <p:extLst>
       <p:ext uri="{BB962C8B-B14F-4D97-AF65-F5344CB8AC3E}">
         <p14:creationId xmlns:p14="http://schemas.microsoft.com/office/powerpoint/2010/main" val="1043642103"/>
-      </p:ext>
-    </p:extLst>
-  </p:cSld>
-  <p:clrMapOvr>
-    <a:masterClrMapping/>
-  </p:clrMapOvr>
-</p:sld>
-</file>
-
-<file path=ppt/slides/slide8.xml><?xml version="1.0" encoding="utf-8"?>
-<p:sld xmlns:a="http://schemas.openxmlformats.org/drawingml/2006/main" xmlns:r="http://schemas.openxmlformats.org/officeDocument/2006/relationships" xmlns:p="http://schemas.openxmlformats.org/presentationml/2006/main">
-  <p:cSld>
-    <p:bg>
-      <p:bgPr>
-        <a:solidFill>
-          <a:schemeClr val="bg1"/>
-        </a:solidFill>
-        <a:effectLst/>
-      </p:bgPr>
-    </p:bg>
-    <p:spTree>
-      <p:nvGrpSpPr>
-        <p:cNvPr id="1" name=""/>
-        <p:cNvGrpSpPr/>
-        <p:nvPr/>
-      </p:nvGrpSpPr>
-      <p:grpSpPr>
-        <a:xfrm>
-          <a:off x="0" y="0"/>
-          <a:ext cx="0" cy="0"/>
-          <a:chOff x="0" y="0"/>
-          <a:chExt cx="0" cy="0"/>
-        </a:xfrm>
-      </p:grpSpPr>
-      <p:sp useBgFill="1">
-        <p:nvSpPr>
-          <p:cNvPr id="17" name="Rectangle 16">
-            <a:extLst>
-              <a:ext uri="{FF2B5EF4-FFF2-40B4-BE49-F238E27FC236}">
-                <a16:creationId xmlns:a16="http://schemas.microsoft.com/office/drawing/2014/main" id="{9D25F302-27C5-414F-97F8-6EA0A6C028BA}"/>
-              </a:ext>
-              <a:ext uri="{C183D7F6-B498-43B3-948B-1728B52AA6E4}">
-                <adec:decorative xmlns:adec="http://schemas.microsoft.com/office/drawing/2017/decorative" val="1"/>
-              </a:ext>
-            </a:extLst>
-          </p:cNvPr>
-          <p:cNvSpPr>
-            <a:spLocks noGrp="1" noRot="1" noChangeAspect="1" noMove="1" noResize="1" noEditPoints="1" noAdjustHandles="1" noChangeArrowheads="1" noChangeShapeType="1" noTextEdit="1"/>
-          </p:cNvSpPr>
-          <p:nvPr>
-            <p:extLst>
-              <p:ext uri="{386F3935-93C4-4BCD-93E2-E3B085C9AB24}">
-                <p16:designElem xmlns:p16="http://schemas.microsoft.com/office/powerpoint/2015/main" val="1"/>
-              </p:ext>
-            </p:extLst>
-          </p:nvPr>
-        </p:nvSpPr>
-        <p:spPr>
-          <a:xfrm>
-            <a:off x="0" y="0"/>
-            <a:ext cx="12192000" cy="6858000"/>
-          </a:xfrm>
-          <a:prstGeom prst="rect">
-            <a:avLst/>
-          </a:prstGeom>
-          <a:ln>
-            <a:noFill/>
-          </a:ln>
-        </p:spPr>
-        <p:style>
-          <a:lnRef idx="2">
-            <a:schemeClr val="accent1">
-              <a:shade val="50000"/>
-            </a:schemeClr>
-          </a:lnRef>
-          <a:fillRef idx="1">
-            <a:schemeClr val="accent1"/>
-          </a:fillRef>
-          <a:effectRef idx="0">
-            <a:schemeClr val="accent1"/>
-          </a:effectRef>
-          <a:fontRef idx="minor">
-            <a:schemeClr val="lt1"/>
-          </a:fontRef>
-        </p:style>
-        <p:txBody>
-          <a:bodyPr rtlCol="0" anchor="ctr"/>
-          <a:lstStyle/>
-          <a:p>
-            <a:pPr algn="ctr"/>
-            <a:endParaRPr lang="en-US"/>
-          </a:p>
-        </p:txBody>
-      </p:sp>
-      <p:sp>
-        <p:nvSpPr>
-          <p:cNvPr id="19" name="Right Triangle 18">
-            <a:extLst>
-              <a:ext uri="{FF2B5EF4-FFF2-40B4-BE49-F238E27FC236}">
-                <a16:creationId xmlns:a16="http://schemas.microsoft.com/office/drawing/2014/main" id="{830A36F8-48C2-4842-A87B-8CE8DF4E7FD2}"/>
-              </a:ext>
-              <a:ext uri="{C183D7F6-B498-43B3-948B-1728B52AA6E4}">
-                <adec:decorative xmlns:adec="http://schemas.microsoft.com/office/drawing/2017/decorative" val="1"/>
-              </a:ext>
-            </a:extLst>
-          </p:cNvPr>
-          <p:cNvSpPr>
-            <a:spLocks noGrp="1" noRot="1" noChangeAspect="1" noMove="1" noResize="1" noEditPoints="1" noAdjustHandles="1" noChangeArrowheads="1" noChangeShapeType="1" noTextEdit="1"/>
-          </p:cNvSpPr>
-          <p:nvPr>
-            <p:extLst>
-              <p:ext uri="{386F3935-93C4-4BCD-93E2-E3B085C9AB24}">
-                <p16:designElem xmlns:p16="http://schemas.microsoft.com/office/powerpoint/2015/main" val="1"/>
-              </p:ext>
-            </p:extLst>
-          </p:nvPr>
-        </p:nvSpPr>
-        <p:spPr>
-          <a:xfrm flipH="1">
-            <a:off x="8576720" y="3335867"/>
-            <a:ext cx="3291840" cy="3200400"/>
-          </a:xfrm>
-          <a:prstGeom prst="rtTriangle">
-            <a:avLst/>
-          </a:prstGeom>
-          <a:solidFill>
-            <a:schemeClr val="accent4"/>
-          </a:solidFill>
-          <a:ln>
-            <a:noFill/>
-          </a:ln>
-        </p:spPr>
-        <p:style>
-          <a:lnRef idx="2">
-            <a:schemeClr val="accent1">
-              <a:shade val="50000"/>
-            </a:schemeClr>
-          </a:lnRef>
-          <a:fillRef idx="1">
-            <a:schemeClr val="accent1"/>
-          </a:fillRef>
-          <a:effectRef idx="0">
-            <a:schemeClr val="accent1"/>
-          </a:effectRef>
-          <a:fontRef idx="minor">
-            <a:schemeClr val="lt1"/>
-          </a:fontRef>
-        </p:style>
-        <p:txBody>
-          <a:bodyPr rtlCol="0" anchor="ctr"/>
-          <a:lstStyle/>
-          <a:p>
-            <a:pPr algn="ctr"/>
-            <a:endParaRPr lang="en-US" dirty="0"/>
-          </a:p>
-        </p:txBody>
-      </p:sp>
-      <p:sp>
-        <p:nvSpPr>
-          <p:cNvPr id="21" name="Rectangle 20">
-            <a:extLst>
-              <a:ext uri="{FF2B5EF4-FFF2-40B4-BE49-F238E27FC236}">
-                <a16:creationId xmlns:a16="http://schemas.microsoft.com/office/drawing/2014/main" id="{8F451A30-466B-4996-9BA5-CD6ABCC6D558}"/>
-              </a:ext>
-              <a:ext uri="{C183D7F6-B498-43B3-948B-1728B52AA6E4}">
-                <adec:decorative xmlns:adec="http://schemas.microsoft.com/office/drawing/2017/decorative" val="1"/>
-              </a:ext>
-            </a:extLst>
-          </p:cNvPr>
-          <p:cNvSpPr>
-            <a:spLocks noGrp="1" noRot="1" noChangeAspect="1" noMove="1" noResize="1" noEditPoints="1" noAdjustHandles="1" noChangeArrowheads="1" noChangeShapeType="1" noTextEdit="1"/>
-          </p:cNvSpPr>
-          <p:nvPr>
-            <p:extLst>
-              <p:ext uri="{386F3935-93C4-4BCD-93E2-E3B085C9AB24}">
-                <p16:designElem xmlns:p16="http://schemas.microsoft.com/office/powerpoint/2015/main" val="1"/>
-              </p:ext>
-            </p:extLst>
-          </p:nvPr>
-        </p:nvSpPr>
-        <p:spPr>
-          <a:xfrm>
-            <a:off x="641774" y="623275"/>
-            <a:ext cx="10905053" cy="5607882"/>
-          </a:xfrm>
-          <a:prstGeom prst="rect">
-            <a:avLst/>
-          </a:prstGeom>
-          <a:noFill/>
-          <a:ln w="19050">
-            <a:solidFill>
-              <a:schemeClr val="tx1">
-                <a:lumMod val="75000"/>
-                <a:lumOff val="25000"/>
-              </a:schemeClr>
-            </a:solidFill>
-          </a:ln>
-        </p:spPr>
-        <p:style>
-          <a:lnRef idx="2">
-            <a:schemeClr val="accent1">
-              <a:shade val="50000"/>
-            </a:schemeClr>
-          </a:lnRef>
-          <a:fillRef idx="1">
-            <a:schemeClr val="accent1"/>
-          </a:fillRef>
-          <a:effectRef idx="0">
-            <a:schemeClr val="accent1"/>
-          </a:effectRef>
-          <a:fontRef idx="minor">
-            <a:schemeClr val="lt1"/>
-          </a:fontRef>
-        </p:style>
-        <p:txBody>
-          <a:bodyPr rtlCol="0" anchor="ctr"/>
-          <a:lstStyle/>
-          <a:p>
-            <a:pPr algn="ctr"/>
-            <a:endParaRPr lang="en-US"/>
-          </a:p>
-        </p:txBody>
-      </p:sp>
-      <p:sp>
-        <p:nvSpPr>
-          <p:cNvPr id="2" name="Title 1">
-            <a:extLst>
-              <a:ext uri="{FF2B5EF4-FFF2-40B4-BE49-F238E27FC236}">
-                <a16:creationId xmlns:a16="http://schemas.microsoft.com/office/drawing/2014/main" id="{8F890B9C-2519-844B-ACDD-8F281676CAAC}"/>
-              </a:ext>
-            </a:extLst>
-          </p:cNvPr>
-          <p:cNvSpPr>
-            <a:spLocks noGrp="1"/>
-          </p:cNvSpPr>
-          <p:nvPr>
-            <p:ph type="title"/>
-          </p:nvPr>
-        </p:nvSpPr>
-        <p:spPr>
-          <a:xfrm>
-            <a:off x="1123356" y="1188637"/>
-            <a:ext cx="9984615" cy="1597228"/>
-          </a:xfrm>
-        </p:spPr>
-        <p:txBody>
-          <a:bodyPr>
-            <a:normAutofit/>
-          </a:bodyPr>
-          <a:lstStyle/>
-          <a:p>
-            <a:r>
-              <a:rPr lang="en-US" sz="6000"/>
-              <a:t>Binary?</a:t>
-            </a:r>
-          </a:p>
-        </p:txBody>
-      </p:sp>
-      <p:pic>
-        <p:nvPicPr>
-          <p:cNvPr id="11" name="Picture 10" descr="A close - up of a building&#10;&#10;Description automatically generated with low confidence">
-            <a:extLst>
-              <a:ext uri="{FF2B5EF4-FFF2-40B4-BE49-F238E27FC236}">
-                <a16:creationId xmlns:a16="http://schemas.microsoft.com/office/drawing/2014/main" id="{B0AAD221-BAA4-2F40-AA8E-E4A9606948DD}"/>
-              </a:ext>
-            </a:extLst>
-          </p:cNvPr>
-          <p:cNvPicPr>
-            <a:picLocks noChangeAspect="1"/>
-          </p:cNvPicPr>
-          <p:nvPr/>
-        </p:nvPicPr>
-        <p:blipFill rotWithShape="1">
-          <a:blip r:embed="rId2">
-            <a:extLst>
-              <a:ext uri="{837473B0-CC2E-450A-ABE3-18F120FF3D39}">
-                <a1611:picAttrSrcUrl xmlns:a1611="http://schemas.microsoft.com/office/drawing/2016/11/main" r:id="rId3"/>
-              </a:ext>
-            </a:extLst>
-          </a:blip>
-          <a:srcRect t="3501"/>
-          <a:stretch/>
-        </p:blipFill>
-        <p:spPr>
-          <a:xfrm>
-            <a:off x="1123356" y="2785865"/>
-            <a:ext cx="3533985" cy="2728198"/>
-          </a:xfrm>
-          <a:prstGeom prst="rect">
-            <a:avLst/>
-          </a:prstGeom>
-        </p:spPr>
-      </p:pic>
-      <p:sp>
-        <p:nvSpPr>
-          <p:cNvPr id="3" name="Content Placeholder 2">
-            <a:extLst>
-              <a:ext uri="{FF2B5EF4-FFF2-40B4-BE49-F238E27FC236}">
-                <a16:creationId xmlns:a16="http://schemas.microsoft.com/office/drawing/2014/main" id="{4B4B7A7F-474A-8242-AABD-EC4754E72A60}"/>
-              </a:ext>
-            </a:extLst>
-          </p:cNvPr>
-          <p:cNvSpPr>
-            <a:spLocks noGrp="1"/>
-          </p:cNvSpPr>
-          <p:nvPr>
-            <p:ph idx="1"/>
-          </p:nvPr>
-        </p:nvSpPr>
-        <p:spPr>
-          <a:xfrm>
-            <a:off x="5387926" y="2785865"/>
-            <a:ext cx="4428236" cy="1073858"/>
-          </a:xfrm>
-        </p:spPr>
-        <p:txBody>
-          <a:bodyPr anchor="ctr">
-            <a:normAutofit/>
-          </a:bodyPr>
-          <a:lstStyle/>
-          <a:p>
-            <a:pPr marL="0" indent="0">
-              <a:buNone/>
-            </a:pPr>
-            <a:r>
-              <a:rPr lang="en-US" sz="2000" dirty="0"/>
-              <a:t>Binary is simply a series of 0’s and 1’s</a:t>
-            </a:r>
-          </a:p>
-        </p:txBody>
-      </p:sp>
-      <p:sp>
-        <p:nvSpPr>
-          <p:cNvPr id="13" name="TextBox 12">
-            <a:extLst>
-              <a:ext uri="{FF2B5EF4-FFF2-40B4-BE49-F238E27FC236}">
-                <a16:creationId xmlns:a16="http://schemas.microsoft.com/office/drawing/2014/main" id="{EED1D7AE-8FD3-A540-80A1-FD193378933E}"/>
-              </a:ext>
-            </a:extLst>
-          </p:cNvPr>
-          <p:cNvSpPr txBox="1"/>
-          <p:nvPr/>
-        </p:nvSpPr>
-        <p:spPr>
-          <a:xfrm>
-            <a:off x="5387926" y="4149964"/>
-            <a:ext cx="3735318" cy="369332"/>
-          </a:xfrm>
-          <a:prstGeom prst="rect">
-            <a:avLst/>
-          </a:prstGeom>
-          <a:noFill/>
-        </p:spPr>
-        <p:txBody>
-          <a:bodyPr wrap="none" rtlCol="0">
-            <a:spAutoFit/>
-          </a:bodyPr>
-          <a:lstStyle/>
-          <a:p>
-            <a:r>
-              <a:rPr lang="en-US" dirty="0"/>
-              <a:t>0010010101000101010100101010…..</a:t>
-            </a:r>
-          </a:p>
-        </p:txBody>
-      </p:sp>
-    </p:spTree>
-    <p:extLst>
-      <p:ext uri="{BB962C8B-B14F-4D97-AF65-F5344CB8AC3E}">
-        <p14:creationId xmlns:p14="http://schemas.microsoft.com/office/powerpoint/2010/main" val="3352144595"/>
-      </p:ext>
-    </p:extLst>
-  </p:cSld>
-  <p:clrMapOvr>
-    <a:masterClrMapping/>
-  </p:clrMapOvr>
-</p:sld>
-</file>
-
-<file path=ppt/slides/slide9.xml><?xml version="1.0" encoding="utf-8"?>
-<p:sld xmlns:a="http://schemas.openxmlformats.org/drawingml/2006/main" xmlns:r="http://schemas.openxmlformats.org/officeDocument/2006/relationships" xmlns:p="http://schemas.openxmlformats.org/presentationml/2006/main">
-  <p:cSld>
-    <p:spTree>
-      <p:nvGrpSpPr>
-        <p:cNvPr id="1" name=""/>
-        <p:cNvGrpSpPr/>
-        <p:nvPr/>
-      </p:nvGrpSpPr>
-      <p:grpSpPr>
-        <a:xfrm>
-          <a:off x="0" y="0"/>
-          <a:ext cx="0" cy="0"/>
-          <a:chOff x="0" y="0"/>
-          <a:chExt cx="0" cy="0"/>
-        </a:xfrm>
-      </p:grpSpPr>
-      <p:pic>
-        <p:nvPicPr>
-          <p:cNvPr id="5" name="Graphic 4" descr="Man with solid fill">
-            <a:extLst>
-              <a:ext uri="{FF2B5EF4-FFF2-40B4-BE49-F238E27FC236}">
-                <a16:creationId xmlns:a16="http://schemas.microsoft.com/office/drawing/2014/main" id="{271B71DD-EC5F-2549-8B02-07B7C26AE8C7}"/>
-              </a:ext>
-            </a:extLst>
-          </p:cNvPr>
-          <p:cNvPicPr>
-            <a:picLocks noChangeAspect="1"/>
-          </p:cNvPicPr>
-          <p:nvPr/>
-        </p:nvPicPr>
-        <p:blipFill>
-          <a:blip r:embed="rId2">
-            <a:extLst>
-              <a:ext uri="{96DAC541-7B7A-43D3-8B79-37D633B846F1}">
-                <asvg:svgBlip xmlns:asvg="http://schemas.microsoft.com/office/drawing/2016/SVG/main" r:embed="rId3"/>
-              </a:ext>
-            </a:extLst>
-          </a:blip>
-          <a:stretch>
-            <a:fillRect/>
-          </a:stretch>
-        </p:blipFill>
-        <p:spPr>
-          <a:xfrm>
-            <a:off x="1289221" y="2454124"/>
-            <a:ext cx="2620620" cy="2620620"/>
-          </a:xfrm>
-          <a:prstGeom prst="rect">
-            <a:avLst/>
-          </a:prstGeom>
-        </p:spPr>
-      </p:pic>
-      <p:pic>
-        <p:nvPicPr>
-          <p:cNvPr id="7" name="Graphic 6" descr="Monitor outline">
-            <a:extLst>
-              <a:ext uri="{FF2B5EF4-FFF2-40B4-BE49-F238E27FC236}">
-                <a16:creationId xmlns:a16="http://schemas.microsoft.com/office/drawing/2014/main" id="{CA5D6A5D-9C15-0A41-91B4-756AE1AFDE99}"/>
-              </a:ext>
-            </a:extLst>
-          </p:cNvPr>
-          <p:cNvPicPr>
-            <a:picLocks noChangeAspect="1"/>
-          </p:cNvPicPr>
-          <p:nvPr/>
-        </p:nvPicPr>
-        <p:blipFill>
-          <a:blip r:embed="rId4">
-            <a:extLst>
-              <a:ext uri="{96DAC541-7B7A-43D3-8B79-37D633B846F1}">
-                <asvg:svgBlip xmlns:asvg="http://schemas.microsoft.com/office/drawing/2016/SVG/main" r:embed="rId5"/>
-              </a:ext>
-            </a:extLst>
-          </a:blip>
-          <a:stretch>
-            <a:fillRect/>
-          </a:stretch>
-        </p:blipFill>
-        <p:spPr>
-          <a:xfrm>
-            <a:off x="8282161" y="2454124"/>
-            <a:ext cx="2789493" cy="2789493"/>
-          </a:xfrm>
-          <a:prstGeom prst="rect">
-            <a:avLst/>
-          </a:prstGeom>
-        </p:spPr>
-      </p:pic>
-      <p:sp>
-        <p:nvSpPr>
-          <p:cNvPr id="10" name="Rectangular Callout 9">
-            <a:extLst>
-              <a:ext uri="{FF2B5EF4-FFF2-40B4-BE49-F238E27FC236}">
-                <a16:creationId xmlns:a16="http://schemas.microsoft.com/office/drawing/2014/main" id="{E9C0D844-6190-7B4B-AD13-CACA13F25103}"/>
-              </a:ext>
-            </a:extLst>
-          </p:cNvPr>
-          <p:cNvSpPr/>
-          <p:nvPr/>
-        </p:nvSpPr>
-        <p:spPr>
-          <a:xfrm>
-            <a:off x="2916195" y="2250237"/>
-            <a:ext cx="4102442" cy="407774"/>
-          </a:xfrm>
-          <a:prstGeom prst="wedgeRectCallout">
-            <a:avLst>
-              <a:gd name="adj1" fmla="val -37364"/>
-              <a:gd name="adj2" fmla="val 102822"/>
-            </a:avLst>
-          </a:prstGeom>
-        </p:spPr>
-        <p:style>
-          <a:lnRef idx="2">
-            <a:schemeClr val="accent1">
-              <a:shade val="50000"/>
-            </a:schemeClr>
-          </a:lnRef>
-          <a:fillRef idx="1">
-            <a:schemeClr val="accent1"/>
-          </a:fillRef>
-          <a:effectRef idx="0">
-            <a:schemeClr val="accent1"/>
-          </a:effectRef>
-          <a:fontRef idx="minor">
-            <a:schemeClr val="lt1"/>
-          </a:fontRef>
-        </p:style>
-        <p:txBody>
-          <a:bodyPr rtlCol="0" anchor="ctr"/>
-          <a:lstStyle/>
-          <a:p>
-            <a:pPr algn="ctr"/>
-            <a:r>
-              <a:rPr lang="en-US" dirty="0"/>
-              <a:t>Hey, calculate for me the square root of 9</a:t>
-            </a:r>
-          </a:p>
-        </p:txBody>
-      </p:sp>
-      <p:cxnSp>
-        <p:nvCxnSpPr>
-          <p:cNvPr id="12" name="Straight Arrow Connector 11">
-            <a:extLst>
-              <a:ext uri="{FF2B5EF4-FFF2-40B4-BE49-F238E27FC236}">
-                <a16:creationId xmlns:a16="http://schemas.microsoft.com/office/drawing/2014/main" id="{EECAF30F-17B6-E64C-8F31-9E72B193E3F1}"/>
-              </a:ext>
-            </a:extLst>
-          </p:cNvPr>
-          <p:cNvCxnSpPr/>
-          <p:nvPr/>
-        </p:nvCxnSpPr>
-        <p:spPr>
-          <a:xfrm>
-            <a:off x="4034974" y="3910161"/>
-            <a:ext cx="4122051" cy="0"/>
-          </a:xfrm>
-          <a:prstGeom prst="straightConnector1">
-            <a:avLst/>
-          </a:prstGeom>
-          <a:ln w="57150">
-            <a:tailEnd type="triangle"/>
-          </a:ln>
-        </p:spPr>
-        <p:style>
-          <a:lnRef idx="1">
-            <a:schemeClr val="accent1"/>
-          </a:lnRef>
-          <a:fillRef idx="0">
-            <a:schemeClr val="accent1"/>
-          </a:fillRef>
-          <a:effectRef idx="0">
-            <a:schemeClr val="accent1"/>
-          </a:effectRef>
-          <a:fontRef idx="minor">
-            <a:schemeClr val="tx1"/>
-          </a:fontRef>
-        </p:style>
-      </p:cxnSp>
-      <p:sp>
-        <p:nvSpPr>
-          <p:cNvPr id="11" name="TextBox 10">
-            <a:extLst>
-              <a:ext uri="{FF2B5EF4-FFF2-40B4-BE49-F238E27FC236}">
-                <a16:creationId xmlns:a16="http://schemas.microsoft.com/office/drawing/2014/main" id="{DFBF4528-72F6-B144-826F-238B51B522F5}"/>
-              </a:ext>
-            </a:extLst>
-          </p:cNvPr>
-          <p:cNvSpPr txBox="1"/>
-          <p:nvPr/>
-        </p:nvSpPr>
-        <p:spPr>
-          <a:xfrm>
-            <a:off x="4379183" y="3516609"/>
-            <a:ext cx="3735318" cy="369332"/>
-          </a:xfrm>
-          <a:prstGeom prst="rect">
-            <a:avLst/>
-          </a:prstGeom>
-          <a:noFill/>
-        </p:spPr>
-        <p:txBody>
-          <a:bodyPr wrap="none" rtlCol="0">
-            <a:spAutoFit/>
-          </a:bodyPr>
-          <a:lstStyle/>
-          <a:p>
-            <a:r>
-              <a:rPr lang="en-US" dirty="0"/>
-              <a:t>0010010101000101010100101010…..</a:t>
-            </a:r>
-          </a:p>
-        </p:txBody>
-      </p:sp>
-      <p:sp>
-        <p:nvSpPr>
-          <p:cNvPr id="6" name="Content Placeholder 5">
-            <a:extLst>
-              <a:ext uri="{FF2B5EF4-FFF2-40B4-BE49-F238E27FC236}">
-                <a16:creationId xmlns:a16="http://schemas.microsoft.com/office/drawing/2014/main" id="{0BF0383F-3512-4648-AB95-336EC2FE335D}"/>
-              </a:ext>
-            </a:extLst>
-          </p:cNvPr>
-          <p:cNvSpPr>
-            <a:spLocks noGrp="1"/>
-          </p:cNvSpPr>
-          <p:nvPr>
-            <p:ph idx="1"/>
-          </p:nvPr>
-        </p:nvSpPr>
-        <p:spPr>
-          <a:xfrm>
-            <a:off x="838200" y="1253331"/>
-            <a:ext cx="10515600" cy="4351338"/>
-          </a:xfrm>
-        </p:spPr>
-        <p:txBody>
-          <a:bodyPr/>
-          <a:lstStyle/>
-          <a:p>
-            <a:r>
-              <a:rPr lang="en-US" dirty="0"/>
-              <a:t>Back in the day…</a:t>
-            </a:r>
-          </a:p>
-        </p:txBody>
-      </p:sp>
-      <p:sp>
-        <p:nvSpPr>
-          <p:cNvPr id="15" name="TextBox 14">
-            <a:extLst>
-              <a:ext uri="{FF2B5EF4-FFF2-40B4-BE49-F238E27FC236}">
-                <a16:creationId xmlns:a16="http://schemas.microsoft.com/office/drawing/2014/main" id="{685C49FA-6679-0A4C-8453-E8AAE94F08A9}"/>
-              </a:ext>
-            </a:extLst>
-          </p:cNvPr>
-          <p:cNvSpPr txBox="1"/>
-          <p:nvPr/>
-        </p:nvSpPr>
-        <p:spPr>
-          <a:xfrm>
-            <a:off x="9526064" y="3479538"/>
-            <a:ext cx="301686" cy="369332"/>
-          </a:xfrm>
-          <a:prstGeom prst="rect">
-            <a:avLst/>
-          </a:prstGeom>
-          <a:noFill/>
-        </p:spPr>
-        <p:txBody>
-          <a:bodyPr wrap="none" rtlCol="0">
-            <a:spAutoFit/>
-          </a:bodyPr>
-          <a:lstStyle/>
-          <a:p>
-            <a:r>
-              <a:rPr lang="en-US" dirty="0"/>
-              <a:t>3</a:t>
-            </a:r>
-          </a:p>
-        </p:txBody>
-      </p:sp>
-      <p:pic>
-        <p:nvPicPr>
-          <p:cNvPr id="18" name="Picture 17" descr="An aerial view of a city&#10;&#10;Description automatically generated with medium confidence">
-            <a:extLst>
-              <a:ext uri="{FF2B5EF4-FFF2-40B4-BE49-F238E27FC236}">
-                <a16:creationId xmlns:a16="http://schemas.microsoft.com/office/drawing/2014/main" id="{6E0A01E5-AA37-334E-9A52-B4D7DBD88E9A}"/>
-              </a:ext>
-            </a:extLst>
-          </p:cNvPr>
-          <p:cNvPicPr>
-            <a:picLocks noChangeAspect="1"/>
-          </p:cNvPicPr>
-          <p:nvPr/>
-        </p:nvPicPr>
-        <p:blipFill>
-          <a:blip r:embed="rId6">
-            <a:extLst>
-              <a:ext uri="{837473B0-CC2E-450A-ABE3-18F120FF3D39}">
-                <a1611:picAttrSrcUrl xmlns:a1611="http://schemas.microsoft.com/office/drawing/2016/11/main" r:id="rId7"/>
-              </a:ext>
-            </a:extLst>
-          </a:blip>
-          <a:stretch>
-            <a:fillRect/>
-          </a:stretch>
-        </p:blipFill>
-        <p:spPr>
-          <a:xfrm flipV="1">
-            <a:off x="4035354" y="4197922"/>
-            <a:ext cx="2789493" cy="1704442"/>
-          </a:xfrm>
-          <a:prstGeom prst="rect">
-            <a:avLst/>
-          </a:prstGeom>
-        </p:spPr>
-      </p:pic>
-      <p:sp>
-        <p:nvSpPr>
-          <p:cNvPr id="19" name="TextBox 18">
-            <a:extLst>
-              <a:ext uri="{FF2B5EF4-FFF2-40B4-BE49-F238E27FC236}">
-                <a16:creationId xmlns:a16="http://schemas.microsoft.com/office/drawing/2014/main" id="{8ED7DD57-D684-2E4F-B562-4FEDD8ADD330}"/>
-              </a:ext>
-            </a:extLst>
-          </p:cNvPr>
-          <p:cNvSpPr txBox="1"/>
-          <p:nvPr/>
-        </p:nvSpPr>
-        <p:spPr>
-          <a:xfrm rot="10800000" flipV="1">
-            <a:off x="0" y="6574630"/>
-            <a:ext cx="3637704" cy="230832"/>
-          </a:xfrm>
-          <a:prstGeom prst="rect">
-            <a:avLst/>
-          </a:prstGeom>
-          <a:noFill/>
-        </p:spPr>
-        <p:txBody>
-          <a:bodyPr wrap="square" rtlCol="0">
-            <a:spAutoFit/>
-          </a:bodyPr>
-          <a:lstStyle/>
-          <a:p>
-            <a:r>
-              <a:rPr lang="en-US" sz="900" dirty="0">
-                <a:hlinkClick r:id="rId7" tooltip="https://en.wikipedia.org/wiki/Computer_program"/>
-              </a:rPr>
-              <a:t>This Photo</a:t>
-            </a:r>
-            <a:r>
-              <a:rPr lang="en-US" sz="900" dirty="0"/>
-              <a:t> by Unknown Author is licensed under </a:t>
-            </a:r>
-            <a:r>
-              <a:rPr lang="en-US" sz="900" dirty="0">
-                <a:hlinkClick r:id="rId8" tooltip="https://creativecommons.org/licenses/by-sa/3.0/"/>
-              </a:rPr>
-              <a:t>CC BY-SA</a:t>
-            </a:r>
-            <a:endParaRPr lang="en-US" sz="900" dirty="0"/>
-          </a:p>
-        </p:txBody>
-      </p:sp>
-      <p:pic>
-        <p:nvPicPr>
-          <p:cNvPr id="21" name="Picture 20" descr="Text, letter&#10;&#10;Description automatically generated">
-            <a:extLst>
-              <a:ext uri="{FF2B5EF4-FFF2-40B4-BE49-F238E27FC236}">
-                <a16:creationId xmlns:a16="http://schemas.microsoft.com/office/drawing/2014/main" id="{A126C503-410D-BC4D-AE7F-4CEFE2CC5EF6}"/>
-              </a:ext>
-            </a:extLst>
-          </p:cNvPr>
-          <p:cNvPicPr>
-            <a:picLocks noChangeAspect="1"/>
-          </p:cNvPicPr>
-          <p:nvPr/>
-        </p:nvPicPr>
-        <p:blipFill>
-          <a:blip r:embed="rId9">
-            <a:extLst>
-              <a:ext uri="{837473B0-CC2E-450A-ABE3-18F120FF3D39}">
-                <a1611:picAttrSrcUrl xmlns:a1611="http://schemas.microsoft.com/office/drawing/2016/11/main" r:id="rId10"/>
-              </a:ext>
-            </a:extLst>
-          </a:blip>
-          <a:stretch>
-            <a:fillRect/>
-          </a:stretch>
-        </p:blipFill>
-        <p:spPr>
-          <a:xfrm>
-            <a:off x="5511805" y="4440155"/>
-            <a:ext cx="2876356" cy="1839669"/>
-          </a:xfrm>
-          <a:prstGeom prst="rect">
-            <a:avLst/>
-          </a:prstGeom>
-        </p:spPr>
-      </p:pic>
-      <p:sp>
-        <p:nvSpPr>
-          <p:cNvPr id="22" name="TextBox 21">
-            <a:extLst>
-              <a:ext uri="{FF2B5EF4-FFF2-40B4-BE49-F238E27FC236}">
-                <a16:creationId xmlns:a16="http://schemas.microsoft.com/office/drawing/2014/main" id="{22042F0D-CCD3-5B42-A84A-1C48AECEA8B7}"/>
-              </a:ext>
-            </a:extLst>
-          </p:cNvPr>
-          <p:cNvSpPr txBox="1"/>
-          <p:nvPr/>
-        </p:nvSpPr>
-        <p:spPr>
-          <a:xfrm>
-            <a:off x="0" y="6344333"/>
-            <a:ext cx="3111134" cy="230833"/>
-          </a:xfrm>
-          <a:prstGeom prst="rect">
-            <a:avLst/>
-          </a:prstGeom>
-          <a:noFill/>
-        </p:spPr>
-        <p:txBody>
-          <a:bodyPr wrap="square" rtlCol="0">
-            <a:spAutoFit/>
-          </a:bodyPr>
-          <a:lstStyle/>
-          <a:p>
-            <a:r>
-              <a:rPr lang="en-US" sz="900" dirty="0">
-                <a:hlinkClick r:id="rId10" tooltip="https://commons.wikimedia.org/wiki/File:Cromemco_Dazzlemation_Program_on_Punched_Paper_Tape.jpg"/>
-              </a:rPr>
-              <a:t>This Photo</a:t>
-            </a:r>
-            <a:r>
-              <a:rPr lang="en-US" sz="900" dirty="0"/>
-              <a:t> by Unknown Author is licensed under </a:t>
-            </a:r>
-            <a:r>
-              <a:rPr lang="en-US" sz="900" dirty="0">
-                <a:hlinkClick r:id="rId8" tooltip="https://creativecommons.org/licenses/by-sa/3.0/"/>
-              </a:rPr>
-              <a:t>CC BY-SA</a:t>
-            </a:r>
-            <a:endParaRPr lang="en-US" sz="900" dirty="0"/>
-          </a:p>
-        </p:txBody>
-      </p:sp>
-    </p:spTree>
-    <p:extLst>
-      <p:ext uri="{BB962C8B-B14F-4D97-AF65-F5344CB8AC3E}">
-        <p14:creationId xmlns:p14="http://schemas.microsoft.com/office/powerpoint/2010/main" val="2603015285"/>
       </p:ext>
     </p:extLst>
   </p:cSld>
@@ -9376,4 +10066,299 @@
     </a:ext>
   </a:extLst>
 </a:theme>
+</file>
+
+<file path=ppt/theme/theme2.xml><?xml version="1.0" encoding="utf-8"?>
+<a:theme xmlns:a="http://schemas.openxmlformats.org/drawingml/2006/main" name="Office Theme">
+  <a:themeElements>
+    <a:clrScheme name="Office">
+      <a:dk1>
+        <a:sysClr val="windowText" lastClr="000000"/>
+      </a:dk1>
+      <a:lt1>
+        <a:sysClr val="window" lastClr="FFFFFF"/>
+      </a:lt1>
+      <a:dk2>
+        <a:srgbClr val="44546A"/>
+      </a:dk2>
+      <a:lt2>
+        <a:srgbClr val="E7E6E6"/>
+      </a:lt2>
+      <a:accent1>
+        <a:srgbClr val="4472C4"/>
+      </a:accent1>
+      <a:accent2>
+        <a:srgbClr val="ED7D31"/>
+      </a:accent2>
+      <a:accent3>
+        <a:srgbClr val="A5A5A5"/>
+      </a:accent3>
+      <a:accent4>
+        <a:srgbClr val="FFC000"/>
+      </a:accent4>
+      <a:accent5>
+        <a:srgbClr val="5B9BD5"/>
+      </a:accent5>
+      <a:accent6>
+        <a:srgbClr val="70AD47"/>
+      </a:accent6>
+      <a:hlink>
+        <a:srgbClr val="0563C1"/>
+      </a:hlink>
+      <a:folHlink>
+        <a:srgbClr val="954F72"/>
+      </a:folHlink>
+    </a:clrScheme>
+    <a:fontScheme name="Office">
+      <a:majorFont>
+        <a:latin typeface="Calibri Light" panose="020F0302020204030204"/>
+        <a:ea typeface=""/>
+        <a:cs typeface=""/>
+        <a:font script="Jpan" typeface="游ゴシック Light"/>
+        <a:font script="Hang" typeface="맑은 고딕"/>
+        <a:font script="Hans" typeface="等线 Light"/>
+        <a:font script="Hant" typeface="新細明體"/>
+        <a:font script="Arab" typeface="Times New Roman"/>
+        <a:font script="Hebr" typeface="Times New Roman"/>
+        <a:font script="Thai" typeface="Angsana New"/>
+        <a:font script="Ethi" typeface="Nyala"/>
+        <a:font script="Beng" typeface="Vrinda"/>
+        <a:font script="Gujr" typeface="Shruti"/>
+        <a:font script="Khmr" typeface="MoolBoran"/>
+        <a:font script="Knda" typeface="Tunga"/>
+        <a:font script="Guru" typeface="Raavi"/>
+        <a:font script="Cans" typeface="Euphemia"/>
+        <a:font script="Cher" typeface="Plantagenet Cherokee"/>
+        <a:font script="Yiii" typeface="Microsoft Yi Baiti"/>
+        <a:font script="Tibt" typeface="Microsoft Himalaya"/>
+        <a:font script="Thaa" typeface="MV Boli"/>
+        <a:font script="Deva" typeface="Mangal"/>
+        <a:font script="Telu" typeface="Gautami"/>
+        <a:font script="Taml" typeface="Latha"/>
+        <a:font script="Syrc" typeface="Estrangelo Edessa"/>
+        <a:font script="Orya" typeface="Kalinga"/>
+        <a:font script="Mlym" typeface="Kartika"/>
+        <a:font script="Laoo" typeface="DokChampa"/>
+        <a:font script="Sinh" typeface="Iskoola Pota"/>
+        <a:font script="Mong" typeface="Mongolian Baiti"/>
+        <a:font script="Viet" typeface="Times New Roman"/>
+        <a:font script="Uigh" typeface="Microsoft Uighur"/>
+        <a:font script="Geor" typeface="Sylfaen"/>
+        <a:font script="Armn" typeface="Arial"/>
+        <a:font script="Bugi" typeface="Leelawadee UI"/>
+        <a:font script="Bopo" typeface="Microsoft JhengHei"/>
+        <a:font script="Java" typeface="Javanese Text"/>
+        <a:font script="Lisu" typeface="Segoe UI"/>
+        <a:font script="Mymr" typeface="Myanmar Text"/>
+        <a:font script="Nkoo" typeface="Ebrima"/>
+        <a:font script="Olck" typeface="Nirmala UI"/>
+        <a:font script="Osma" typeface="Ebrima"/>
+        <a:font script="Phag" typeface="Phagspa"/>
+        <a:font script="Syrn" typeface="Estrangelo Edessa"/>
+        <a:font script="Syrj" typeface="Estrangelo Edessa"/>
+        <a:font script="Syre" typeface="Estrangelo Edessa"/>
+        <a:font script="Sora" typeface="Nirmala UI"/>
+        <a:font script="Tale" typeface="Microsoft Tai Le"/>
+        <a:font script="Talu" typeface="Microsoft New Tai Lue"/>
+        <a:font script="Tfng" typeface="Ebrima"/>
+      </a:majorFont>
+      <a:minorFont>
+        <a:latin typeface="Calibri" panose="020F0502020204030204"/>
+        <a:ea typeface=""/>
+        <a:cs typeface=""/>
+        <a:font script="Jpan" typeface="游ゴシック"/>
+        <a:font script="Hang" typeface="맑은 고딕"/>
+        <a:font script="Hans" typeface="等线"/>
+        <a:font script="Hant" typeface="新細明體"/>
+        <a:font script="Arab" typeface="Arial"/>
+        <a:font script="Hebr" typeface="Arial"/>
+        <a:font script="Thai" typeface="Cordia New"/>
+        <a:font script="Ethi" typeface="Nyala"/>
+        <a:font script="Beng" typeface="Vrinda"/>
+        <a:font script="Gujr" typeface="Shruti"/>
+        <a:font script="Khmr" typeface="DaunPenh"/>
+        <a:font script="Knda" typeface="Tunga"/>
+        <a:font script="Guru" typeface="Raavi"/>
+        <a:font script="Cans" typeface="Euphemia"/>
+        <a:font script="Cher" typeface="Plantagenet Cherokee"/>
+        <a:font script="Yiii" typeface="Microsoft Yi Baiti"/>
+        <a:font script="Tibt" typeface="Microsoft Himalaya"/>
+        <a:font script="Thaa" typeface="MV Boli"/>
+        <a:font script="Deva" typeface="Mangal"/>
+        <a:font script="Telu" typeface="Gautami"/>
+        <a:font script="Taml" typeface="Latha"/>
+        <a:font script="Syrc" typeface="Estrangelo Edessa"/>
+        <a:font script="Orya" typeface="Kalinga"/>
+        <a:font script="Mlym" typeface="Kartika"/>
+        <a:font script="Laoo" typeface="DokChampa"/>
+        <a:font script="Sinh" typeface="Iskoola Pota"/>
+        <a:font script="Mong" typeface="Mongolian Baiti"/>
+        <a:font script="Viet" typeface="Arial"/>
+        <a:font script="Uigh" typeface="Microsoft Uighur"/>
+        <a:font script="Geor" typeface="Sylfaen"/>
+        <a:font script="Armn" typeface="Arial"/>
+        <a:font script="Bugi" typeface="Leelawadee UI"/>
+        <a:font script="Bopo" typeface="Microsoft JhengHei"/>
+        <a:font script="Java" typeface="Javanese Text"/>
+        <a:font script="Lisu" typeface="Segoe UI"/>
+        <a:font script="Mymr" typeface="Myanmar Text"/>
+        <a:font script="Nkoo" typeface="Ebrima"/>
+        <a:font script="Olck" typeface="Nirmala UI"/>
+        <a:font script="Osma" typeface="Ebrima"/>
+        <a:font script="Phag" typeface="Phagspa"/>
+        <a:font script="Syrn" typeface="Estrangelo Edessa"/>
+        <a:font script="Syrj" typeface="Estrangelo Edessa"/>
+        <a:font script="Syre" typeface="Estrangelo Edessa"/>
+        <a:font script="Sora" typeface="Nirmala UI"/>
+        <a:font script="Tale" typeface="Microsoft Tai Le"/>
+        <a:font script="Talu" typeface="Microsoft New Tai Lue"/>
+        <a:font script="Tfng" typeface="Ebrima"/>
+      </a:minorFont>
+    </a:fontScheme>
+    <a:fmtScheme name="Office">
+      <a:fillStyleLst>
+        <a:solidFill>
+          <a:schemeClr val="phClr"/>
+        </a:solidFill>
+        <a:gradFill rotWithShape="1">
+          <a:gsLst>
+            <a:gs pos="0">
+              <a:schemeClr val="phClr">
+                <a:lumMod val="110000"/>
+                <a:satMod val="105000"/>
+                <a:tint val="67000"/>
+              </a:schemeClr>
+            </a:gs>
+            <a:gs pos="50000">
+              <a:schemeClr val="phClr">
+                <a:lumMod val="105000"/>
+                <a:satMod val="103000"/>
+                <a:tint val="73000"/>
+              </a:schemeClr>
+            </a:gs>
+            <a:gs pos="100000">
+              <a:schemeClr val="phClr">
+                <a:lumMod val="105000"/>
+                <a:satMod val="109000"/>
+                <a:tint val="81000"/>
+              </a:schemeClr>
+            </a:gs>
+          </a:gsLst>
+          <a:lin ang="5400000" scaled="0"/>
+        </a:gradFill>
+        <a:gradFill rotWithShape="1">
+          <a:gsLst>
+            <a:gs pos="0">
+              <a:schemeClr val="phClr">
+                <a:satMod val="103000"/>
+                <a:lumMod val="102000"/>
+                <a:tint val="94000"/>
+              </a:schemeClr>
+            </a:gs>
+            <a:gs pos="50000">
+              <a:schemeClr val="phClr">
+                <a:satMod val="110000"/>
+                <a:lumMod val="100000"/>
+                <a:shade val="100000"/>
+              </a:schemeClr>
+            </a:gs>
+            <a:gs pos="100000">
+              <a:schemeClr val="phClr">
+                <a:lumMod val="99000"/>
+                <a:satMod val="120000"/>
+                <a:shade val="78000"/>
+              </a:schemeClr>
+            </a:gs>
+          </a:gsLst>
+          <a:lin ang="5400000" scaled="0"/>
+        </a:gradFill>
+      </a:fillStyleLst>
+      <a:lnStyleLst>
+        <a:ln w="6350" cap="flat" cmpd="sng" algn="ctr">
+          <a:solidFill>
+            <a:schemeClr val="phClr"/>
+          </a:solidFill>
+          <a:prstDash val="solid"/>
+          <a:miter lim="800000"/>
+        </a:ln>
+        <a:ln w="12700" cap="flat" cmpd="sng" algn="ctr">
+          <a:solidFill>
+            <a:schemeClr val="phClr"/>
+          </a:solidFill>
+          <a:prstDash val="solid"/>
+          <a:miter lim="800000"/>
+        </a:ln>
+        <a:ln w="19050" cap="flat" cmpd="sng" algn="ctr">
+          <a:solidFill>
+            <a:schemeClr val="phClr"/>
+          </a:solidFill>
+          <a:prstDash val="solid"/>
+          <a:miter lim="800000"/>
+        </a:ln>
+      </a:lnStyleLst>
+      <a:effectStyleLst>
+        <a:effectStyle>
+          <a:effectLst/>
+        </a:effectStyle>
+        <a:effectStyle>
+          <a:effectLst/>
+        </a:effectStyle>
+        <a:effectStyle>
+          <a:effectLst>
+            <a:outerShdw blurRad="57150" dist="19050" dir="5400000" algn="ctr" rotWithShape="0">
+              <a:srgbClr val="000000">
+                <a:alpha val="63000"/>
+              </a:srgbClr>
+            </a:outerShdw>
+          </a:effectLst>
+        </a:effectStyle>
+      </a:effectStyleLst>
+      <a:bgFillStyleLst>
+        <a:solidFill>
+          <a:schemeClr val="phClr"/>
+        </a:solidFill>
+        <a:solidFill>
+          <a:schemeClr val="phClr">
+            <a:tint val="95000"/>
+            <a:satMod val="170000"/>
+          </a:schemeClr>
+        </a:solidFill>
+        <a:gradFill rotWithShape="1">
+          <a:gsLst>
+            <a:gs pos="0">
+              <a:schemeClr val="phClr">
+                <a:tint val="93000"/>
+                <a:satMod val="150000"/>
+                <a:shade val="98000"/>
+                <a:lumMod val="102000"/>
+              </a:schemeClr>
+            </a:gs>
+            <a:gs pos="50000">
+              <a:schemeClr val="phClr">
+                <a:tint val="98000"/>
+                <a:satMod val="130000"/>
+                <a:shade val="90000"/>
+                <a:lumMod val="103000"/>
+              </a:schemeClr>
+            </a:gs>
+            <a:gs pos="100000">
+              <a:schemeClr val="phClr">
+                <a:shade val="63000"/>
+                <a:satMod val="120000"/>
+              </a:schemeClr>
+            </a:gs>
+          </a:gsLst>
+          <a:lin ang="5400000" scaled="0"/>
+        </a:gradFill>
+      </a:bgFillStyleLst>
+    </a:fmtScheme>
+  </a:themeElements>
+  <a:objectDefaults/>
+  <a:extraClrSchemeLst/>
+  <a:extLst>
+    <a:ext uri="{05A4C25C-085E-4340-85A3-A5531E510DB2}">
+      <thm15:themeFamily xmlns:thm15="http://schemas.microsoft.com/office/thememl/2012/main" name="Office Theme" id="{62F939B6-93AF-4DB8-9C6B-D6C7DFDC589F}" vid="{4A3C46E8-61CC-4603-A589-7422A47A8E4A}"/>
+    </a:ext>
+  </a:extLst>
+</a:theme>
 </file>
</xml_diff>